<commit_message>
Update to ASP.Net Core 3.1
</commit_message>
<xml_diff>
--- a/TestingASPNetCore.pptx
+++ b/TestingASPNetCore.pptx
@@ -2,7 +2,7 @@
 <file path=ppt/presentation.xml><?xml version="1.0" encoding="utf-8"?>
 <p:presentation xmlns:a="http://schemas.openxmlformats.org/drawingml/2006/main" xmlns:r="http://schemas.openxmlformats.org/officeDocument/2006/relationships" xmlns:p="http://schemas.openxmlformats.org/presentationml/2006/main" saveSubsetFonts="1">
   <p:sldMasterIdLst>
-    <p:sldMasterId id="2147483672" r:id="rId1"/>
+    <p:sldMasterId id="2147483684" r:id="rId1"/>
   </p:sldMasterIdLst>
   <p:notesMasterIdLst>
     <p:notesMasterId r:id="rId18"/>
@@ -2866,7 +2866,7 @@
           <a:p>
             <a:fld id="{7B950E3B-A481-48AE-8D69-75E603211DD4}" type="datetimeFigureOut">
               <a:rPr lang="en-US" smtClean="0"/>
-              <a:t>8/19/2019</a:t>
+              <a:t>10/6/2020</a:t>
             </a:fld>
             <a:endParaRPr lang="en-US"/>
           </a:p>
@@ -3593,8 +3593,8 @@
         </p:nvSpPr>
         <p:spPr>
           <a:xfrm>
-            <a:off x="3175" y="6400800"/>
-            <a:ext cx="12188825" cy="457200"/>
+            <a:off x="1" y="6400800"/>
+            <a:ext cx="12192000" cy="457200"/>
           </a:xfrm>
           <a:prstGeom prst="rect">
             <a:avLst/>
@@ -3631,8 +3631,8 @@
         </p:nvSpPr>
         <p:spPr>
           <a:xfrm>
-            <a:off x="15" y="6334316"/>
-            <a:ext cx="12188825" cy="64008"/>
+            <a:off x="1" y="6334316"/>
+            <a:ext cx="12192000" cy="66484"/>
           </a:xfrm>
           <a:prstGeom prst="rect">
             <a:avLst/>
@@ -3794,7 +3794,7 @@
           <a:p>
             <a:fld id="{0BCF7C18-C7ED-4823-B3E1-8D5A44B798DB}" type="datetime1">
               <a:rPr lang="en-US" smtClean="0"/>
-              <a:t>8/19/2019</a:t>
+              <a:t>10/6/2020</a:t>
             </a:fld>
             <a:endParaRPr lang="en-US"/>
           </a:p>
@@ -3813,10 +3813,14 @@
         <p:spPr/>
         <p:txBody>
           <a:bodyPr/>
-          <a:lstStyle/>
-          <a:p>
-            <a:r>
-              <a:rPr lang="en-US"/>
+          <a:lstStyle>
+            <a:lvl1pPr>
+              <a:defRPr sz="1200"/>
+            </a:lvl1pPr>
+          </a:lstStyle>
+          <a:p>
+            <a:r>
+              <a:rPr lang="en-US" dirty="0"/>
               <a:t>https://github.com/joegardnr/TestingAspNetCore</a:t>
             </a:r>
           </a:p>
@@ -3886,7 +3890,7 @@
     </p:spTree>
     <p:extLst>
       <p:ext uri="{BB962C8B-B14F-4D97-AF65-F5344CB8AC3E}">
-        <p14:creationId xmlns:p14="http://schemas.microsoft.com/office/powerpoint/2010/main" val="2547024489"/>
+        <p14:creationId xmlns:p14="http://schemas.microsoft.com/office/powerpoint/2010/main" val="2837829064"/>
       </p:ext>
     </p:extLst>
   </p:cSld>
@@ -3954,7 +3958,7 @@
             <a:pPr lvl="0"/>
             <a:r>
               <a:rPr lang="en-US"/>
-              <a:t>Edit Master text styles</a:t>
+              <a:t>Click to edit Master text styles</a:t>
             </a:r>
           </a:p>
           <a:p>
@@ -4005,7 +4009,7 @@
           <a:p>
             <a:fld id="{325D1947-6315-4708-818C-C03C9BE7AED5}" type="datetime1">
               <a:rPr lang="en-US" smtClean="0"/>
-              <a:t>8/19/2019</a:t>
+              <a:t>10/6/2020</a:t>
             </a:fld>
             <a:endParaRPr lang="en-US"/>
           </a:p>
@@ -4059,7 +4063,7 @@
     </p:spTree>
     <p:extLst>
       <p:ext uri="{BB962C8B-B14F-4D97-AF65-F5344CB8AC3E}">
-        <p14:creationId xmlns:p14="http://schemas.microsoft.com/office/powerpoint/2010/main" val="3512908556"/>
+        <p14:creationId xmlns:p14="http://schemas.microsoft.com/office/powerpoint/2010/main" val="593289992"/>
       </p:ext>
     </p:extLst>
   </p:cSld>
@@ -4213,7 +4217,7 @@
             <a:pPr lvl="0"/>
             <a:r>
               <a:rPr lang="en-US"/>
-              <a:t>Edit Master text styles</a:t>
+              <a:t>Click to edit Master text styles</a:t>
             </a:r>
           </a:p>
           <a:p>
@@ -4264,7 +4268,7 @@
           <a:p>
             <a:fld id="{6ED82F84-3386-4F72-B15A-46F0008D1DFF}" type="datetime1">
               <a:rPr lang="en-US" smtClean="0"/>
-              <a:t>8/19/2019</a:t>
+              <a:t>10/6/2020</a:t>
             </a:fld>
             <a:endParaRPr lang="en-US"/>
           </a:p>
@@ -4318,7 +4322,7 @@
     </p:spTree>
     <p:extLst>
       <p:ext uri="{BB962C8B-B14F-4D97-AF65-F5344CB8AC3E}">
-        <p14:creationId xmlns:p14="http://schemas.microsoft.com/office/powerpoint/2010/main" val="3900354981"/>
+        <p14:creationId xmlns:p14="http://schemas.microsoft.com/office/powerpoint/2010/main" val="2048199879"/>
       </p:ext>
     </p:extLst>
   </p:cSld>
@@ -4386,7 +4390,7 @@
             <a:pPr lvl="0"/>
             <a:r>
               <a:rPr lang="en-US"/>
-              <a:t>Edit Master text styles</a:t>
+              <a:t>Click to edit Master text styles</a:t>
             </a:r>
           </a:p>
           <a:p>
@@ -4437,7 +4441,7 @@
           <a:p>
             <a:fld id="{EE34D590-BB32-4380-B38B-4A11F5BAD045}" type="datetime1">
               <a:rPr lang="en-US" smtClean="0"/>
-              <a:t>8/19/2019</a:t>
+              <a:t>10/6/2020</a:t>
             </a:fld>
             <a:endParaRPr lang="en-US"/>
           </a:p>
@@ -4491,7 +4495,7 @@
     </p:spTree>
     <p:extLst>
       <p:ext uri="{BB962C8B-B14F-4D97-AF65-F5344CB8AC3E}">
-        <p14:creationId xmlns:p14="http://schemas.microsoft.com/office/powerpoint/2010/main" val="376275351"/>
+        <p14:creationId xmlns:p14="http://schemas.microsoft.com/office/powerpoint/2010/main" val="1532338727"/>
       </p:ext>
     </p:extLst>
   </p:cSld>
@@ -4761,7 +4765,7 @@
             <a:pPr lvl="0"/>
             <a:r>
               <a:rPr lang="en-US"/>
-              <a:t>Edit Master text styles</a:t>
+              <a:t>Click to edit Master text styles</a:t>
             </a:r>
           </a:p>
         </p:txBody>
@@ -4783,7 +4787,7 @@
           <a:p>
             <a:fld id="{90D20639-7E00-47E8-9CA4-2481DFE25361}" type="datetime1">
               <a:rPr lang="en-US" smtClean="0"/>
-              <a:t>8/19/2019</a:t>
+              <a:t>10/6/2020</a:t>
             </a:fld>
             <a:endParaRPr lang="en-US"/>
           </a:p>
@@ -4875,7 +4879,7 @@
     </p:spTree>
     <p:extLst>
       <p:ext uri="{BB962C8B-B14F-4D97-AF65-F5344CB8AC3E}">
-        <p14:creationId xmlns:p14="http://schemas.microsoft.com/office/powerpoint/2010/main" val="1501194768"/>
+        <p14:creationId xmlns:p14="http://schemas.microsoft.com/office/powerpoint/2010/main" val="3220204244"/>
       </p:ext>
     </p:extLst>
   </p:cSld>
@@ -4942,8 +4946,8 @@
         </p:nvSpPr>
         <p:spPr>
           <a:xfrm>
-            <a:off x="1097278" y="1845734"/>
-            <a:ext cx="4937760" cy="4023360"/>
+            <a:off x="1097280" y="1845734"/>
+            <a:ext cx="4937760" cy="4023359"/>
           </a:xfrm>
         </p:spPr>
         <p:txBody>
@@ -4953,7 +4957,7 @@
             <a:pPr lvl="0"/>
             <a:r>
               <a:rPr lang="en-US"/>
-              <a:t>Edit Master text styles</a:t>
+              <a:t>Click to edit Master text styles</a:t>
             </a:r>
           </a:p>
           <a:p>
@@ -5010,7 +5014,7 @@
             <a:pPr lvl="0"/>
             <a:r>
               <a:rPr lang="en-US"/>
-              <a:t>Edit Master text styles</a:t>
+              <a:t>Click to edit Master text styles</a:t>
             </a:r>
           </a:p>
           <a:p>
@@ -5061,7 +5065,7 @@
           <a:p>
             <a:fld id="{FCC8C201-45DE-4DB8-AE17-F76C07FE6801}" type="datetime1">
               <a:rPr lang="en-US" smtClean="0"/>
-              <a:t>8/19/2019</a:t>
+              <a:t>10/6/2020</a:t>
             </a:fld>
             <a:endParaRPr lang="en-US"/>
           </a:p>
@@ -5115,7 +5119,7 @@
     </p:spTree>
     <p:extLst>
       <p:ext uri="{BB962C8B-B14F-4D97-AF65-F5344CB8AC3E}">
-        <p14:creationId xmlns:p14="http://schemas.microsoft.com/office/powerpoint/2010/main" val="2861549761"/>
+        <p14:creationId xmlns:p14="http://schemas.microsoft.com/office/powerpoint/2010/main" val="1051556974"/>
       </p:ext>
     </p:extLst>
   </p:cSld>
@@ -5236,7 +5240,7 @@
             <a:pPr lvl="0"/>
             <a:r>
               <a:rPr lang="en-US"/>
-              <a:t>Edit Master text styles</a:t>
+              <a:t>Click to edit Master text styles</a:t>
             </a:r>
           </a:p>
         </p:txBody>
@@ -5253,8 +5257,8 @@
         </p:nvSpPr>
         <p:spPr>
           <a:xfrm>
-            <a:off x="1097280" y="2582334"/>
-            <a:ext cx="4937760" cy="3378200"/>
+            <a:off x="1097280" y="2582335"/>
+            <a:ext cx="4937760" cy="3286760"/>
           </a:xfrm>
         </p:spPr>
         <p:txBody>
@@ -5264,7 +5268,7 @@
             <a:pPr lvl="0"/>
             <a:r>
               <a:rPr lang="en-US"/>
-              <a:t>Edit Master text styles</a:t>
+              <a:t>Click to edit Master text styles</a:t>
             </a:r>
           </a:p>
           <a:p>
@@ -5364,7 +5368,7 @@
             <a:pPr lvl="0"/>
             <a:r>
               <a:rPr lang="en-US"/>
-              <a:t>Edit Master text styles</a:t>
+              <a:t>Click to edit Master text styles</a:t>
             </a:r>
           </a:p>
         </p:txBody>
@@ -5382,7 +5386,7 @@
         <p:spPr>
           <a:xfrm>
             <a:off x="6217920" y="2582334"/>
-            <a:ext cx="4937760" cy="3378200"/>
+            <a:ext cx="4937760" cy="3286760"/>
           </a:xfrm>
         </p:spPr>
         <p:txBody>
@@ -5392,7 +5396,7 @@
             <a:pPr lvl="0"/>
             <a:r>
               <a:rPr lang="en-US"/>
-              <a:t>Edit Master text styles</a:t>
+              <a:t>Click to edit Master text styles</a:t>
             </a:r>
           </a:p>
           <a:p>
@@ -5443,7 +5447,7 @@
           <a:p>
             <a:fld id="{2F42A3A9-AE8C-4613-BBD9-28F0176DE020}" type="datetime1">
               <a:rPr lang="en-US" smtClean="0"/>
-              <a:t>8/19/2019</a:t>
+              <a:t>10/6/2020</a:t>
             </a:fld>
             <a:endParaRPr lang="en-US"/>
           </a:p>
@@ -5497,7 +5501,7 @@
     </p:spTree>
     <p:extLst>
       <p:ext uri="{BB962C8B-B14F-4D97-AF65-F5344CB8AC3E}">
-        <p14:creationId xmlns:p14="http://schemas.microsoft.com/office/powerpoint/2010/main" val="1405997857"/>
+        <p14:creationId xmlns:p14="http://schemas.microsoft.com/office/powerpoint/2010/main" val="22742177"/>
       </p:ext>
     </p:extLst>
   </p:cSld>
@@ -5564,7 +5568,7 @@
           <a:p>
             <a:fld id="{ECFCE427-A859-4E51-95E7-01FB72063022}" type="datetime1">
               <a:rPr lang="en-US" smtClean="0"/>
-              <a:t>8/19/2019</a:t>
+              <a:t>10/6/2020</a:t>
             </a:fld>
             <a:endParaRPr lang="en-US"/>
           </a:p>
@@ -5618,7 +5622,7 @@
     </p:spTree>
     <p:extLst>
       <p:ext uri="{BB962C8B-B14F-4D97-AF65-F5344CB8AC3E}">
-        <p14:creationId xmlns:p14="http://schemas.microsoft.com/office/powerpoint/2010/main" val="1729682216"/>
+        <p14:creationId xmlns:p14="http://schemas.microsoft.com/office/powerpoint/2010/main" val="2303192708"/>
       </p:ext>
     </p:extLst>
   </p:cSld>
@@ -5738,7 +5742,7 @@
           <a:p>
             <a:fld id="{29CD1139-554B-4DA0-B888-208294307114}" type="datetime1">
               <a:rPr lang="en-US" smtClean="0"/>
-              <a:t>8/19/2019</a:t>
+              <a:t>10/6/2020</a:t>
             </a:fld>
             <a:endParaRPr lang="en-US"/>
           </a:p>
@@ -5800,7 +5804,7 @@
     </p:spTree>
     <p:extLst>
       <p:ext uri="{BB962C8B-B14F-4D97-AF65-F5344CB8AC3E}">
-        <p14:creationId xmlns:p14="http://schemas.microsoft.com/office/powerpoint/2010/main" val="1244005655"/>
+        <p14:creationId xmlns:p14="http://schemas.microsoft.com/office/powerpoint/2010/main" val="3068238419"/>
       </p:ext>
     </p:extLst>
   </p:cSld>
@@ -5964,7 +5968,7 @@
             <a:pPr lvl="0"/>
             <a:r>
               <a:rPr lang="en-US"/>
-              <a:t>Edit Master text styles</a:t>
+              <a:t>Click to edit Master text styles</a:t>
             </a:r>
           </a:p>
           <a:p>
@@ -6064,7 +6068,7 @@
             <a:pPr lvl="0"/>
             <a:r>
               <a:rPr lang="en-US"/>
-              <a:t>Edit Master text styles</a:t>
+              <a:t>Click to edit Master text styles</a:t>
             </a:r>
           </a:p>
         </p:txBody>
@@ -6095,7 +6099,7 @@
           <a:p>
             <a:fld id="{09C0076D-EDB8-4877-9053-F9351FC17A95}" type="datetime1">
               <a:rPr lang="en-US" smtClean="0"/>
-              <a:t>8/19/2019</a:t>
+              <a:t>10/6/2020</a:t>
             </a:fld>
             <a:endParaRPr lang="en-US"/>
           </a:p>
@@ -6170,7 +6174,7 @@
     </p:spTree>
     <p:extLst>
       <p:ext uri="{BB962C8B-B14F-4D97-AF65-F5344CB8AC3E}">
-        <p14:creationId xmlns:p14="http://schemas.microsoft.com/office/powerpoint/2010/main" val="120153332"/>
+        <p14:creationId xmlns:p14="http://schemas.microsoft.com/office/powerpoint/2010/main" val="1301521903"/>
       </p:ext>
     </p:extLst>
   </p:cSld>
@@ -6290,7 +6294,7 @@
           </a:xfrm>
         </p:spPr>
         <p:txBody>
-          <a:bodyPr lIns="91440" tIns="0" rIns="91440" bIns="0" anchor="b">
+          <a:bodyPr tIns="0" bIns="0" anchor="b">
             <a:noAutofit/>
           </a:bodyPr>
           <a:lstStyle>
@@ -6453,7 +6457,7 @@
             <a:pPr lvl="0"/>
             <a:r>
               <a:rPr lang="en-US"/>
-              <a:t>Edit Master text styles</a:t>
+              <a:t>Click to edit Master text styles</a:t>
             </a:r>
           </a:p>
         </p:txBody>
@@ -6475,7 +6479,7 @@
           <a:p>
             <a:fld id="{4BD2C180-8F8A-4C74-950D-3A37A8651DBC}" type="datetime1">
               <a:rPr lang="en-US" smtClean="0"/>
-              <a:t>8/19/2019</a:t>
+              <a:t>10/6/2020</a:t>
             </a:fld>
             <a:endParaRPr lang="en-US"/>
           </a:p>
@@ -6529,7 +6533,7 @@
     </p:spTree>
     <p:extLst>
       <p:ext uri="{BB962C8B-B14F-4D97-AF65-F5344CB8AC3E}">
-        <p14:creationId xmlns:p14="http://schemas.microsoft.com/office/powerpoint/2010/main" val="2648458043"/>
+        <p14:creationId xmlns:p14="http://schemas.microsoft.com/office/powerpoint/2010/main" val="701666806"/>
       </p:ext>
     </p:extLst>
   </p:cSld>
@@ -6569,8 +6573,8 @@
         </p:nvSpPr>
         <p:spPr>
           <a:xfrm>
-            <a:off x="1" y="6400800"/>
-            <a:ext cx="12192000" cy="457200"/>
+            <a:off x="3175" y="6400800"/>
+            <a:ext cx="12188825" cy="457200"/>
           </a:xfrm>
           <a:prstGeom prst="rect">
             <a:avLst/>
@@ -6608,7 +6612,7 @@
         <p:spPr>
           <a:xfrm>
             <a:off x="15" y="6334316"/>
-            <a:ext cx="12191985" cy="66484"/>
+            <a:ext cx="12188825" cy="64008"/>
           </a:xfrm>
           <a:prstGeom prst="rect">
             <a:avLst/>
@@ -6698,7 +6702,7 @@
             <a:pPr lvl="0"/>
             <a:r>
               <a:rPr lang="en-US"/>
-              <a:t>Edit Master text styles</a:t>
+              <a:t>Click to edit Master text styles</a:t>
             </a:r>
           </a:p>
           <a:p>
@@ -6765,7 +6769,7 @@
           <a:p>
             <a:fld id="{001FBD98-E3F9-4E7F-9052-3E28BDC0EF07}" type="datetime1">
               <a:rPr lang="en-US" smtClean="0"/>
-              <a:t>8/19/2019</a:t>
+              <a:t>10/6/2020</a:t>
             </a:fld>
             <a:endParaRPr lang="en-US"/>
           </a:p>
@@ -6794,7 +6798,7 @@
           <a:bodyPr vert="horz" lIns="91440" tIns="45720" rIns="91440" bIns="45720" rtlCol="0" anchor="ctr"/>
           <a:lstStyle>
             <a:lvl1pPr algn="ctr">
-              <a:defRPr sz="1800" cap="none" baseline="0">
+              <a:defRPr sz="1200" cap="all" baseline="0">
                 <a:solidFill>
                   <a:srgbClr val="FFFFFF"/>
                 </a:solidFill>
@@ -6806,6 +6810,7 @@
               <a:rPr lang="en-US" dirty="0"/>
               <a:t>https://github.com/joegardnr/TestingAspNetCore</a:t>
             </a:r>
+            <a:endParaRPr lang="en-US" sz="1200" dirty="0"/>
           </a:p>
         </p:txBody>
       </p:sp>
@@ -6889,23 +6894,23 @@
     </p:spTree>
     <p:extLst>
       <p:ext uri="{BB962C8B-B14F-4D97-AF65-F5344CB8AC3E}">
-        <p14:creationId xmlns:p14="http://schemas.microsoft.com/office/powerpoint/2010/main" val="1031238892"/>
+        <p14:creationId xmlns:p14="http://schemas.microsoft.com/office/powerpoint/2010/main" val="1377276187"/>
       </p:ext>
     </p:extLst>
   </p:cSld>
   <p:clrMap bg1="lt1" tx1="dk1" bg2="lt2" tx2="dk2" accent1="accent1" accent2="accent2" accent3="accent3" accent4="accent4" accent5="accent5" accent6="accent6" hlink="hlink" folHlink="folHlink"/>
   <p:sldLayoutIdLst>
-    <p:sldLayoutId id="2147483673" r:id="rId1"/>
-    <p:sldLayoutId id="2147483674" r:id="rId2"/>
-    <p:sldLayoutId id="2147483675" r:id="rId3"/>
-    <p:sldLayoutId id="2147483676" r:id="rId4"/>
-    <p:sldLayoutId id="2147483677" r:id="rId5"/>
-    <p:sldLayoutId id="2147483678" r:id="rId6"/>
-    <p:sldLayoutId id="2147483679" r:id="rId7"/>
-    <p:sldLayoutId id="2147483680" r:id="rId8"/>
-    <p:sldLayoutId id="2147483681" r:id="rId9"/>
-    <p:sldLayoutId id="2147483682" r:id="rId10"/>
-    <p:sldLayoutId id="2147483683" r:id="rId11"/>
+    <p:sldLayoutId id="2147483685" r:id="rId1"/>
+    <p:sldLayoutId id="2147483686" r:id="rId2"/>
+    <p:sldLayoutId id="2147483687" r:id="rId3"/>
+    <p:sldLayoutId id="2147483688" r:id="rId4"/>
+    <p:sldLayoutId id="2147483689" r:id="rId5"/>
+    <p:sldLayoutId id="2147483690" r:id="rId6"/>
+    <p:sldLayoutId id="2147483691" r:id="rId7"/>
+    <p:sldLayoutId id="2147483692" r:id="rId8"/>
+    <p:sldLayoutId id="2147483693" r:id="rId9"/>
+    <p:sldLayoutId id="2147483694" r:id="rId10"/>
+    <p:sldLayoutId id="2147483695" r:id="rId11"/>
   </p:sldLayoutIdLst>
   <p:hf sldNum="0" hdr="0" dt="0"/>
   <p:txStyles>
@@ -7386,60 +7391,36 @@
             </a:pPr>
             <a:r>
               <a:rPr lang="en-US" dirty="0">
-                <a:hlinkClick r:id="rId2"/>
-              </a:rPr>
-              <a:t>jgardner@clearent.com</a:t>
-            </a:r>
-            <a:r>
-              <a:rPr lang="en-US" dirty="0"/>
-              <a:t> | </a:t>
-            </a:r>
+                <a:hlinkClick r:id="rId3"/>
+              </a:rPr>
+              <a:t>joegardner@gmail.com</a:t>
+            </a:r>
+            <a:endParaRPr lang="en-US" dirty="0"/>
+          </a:p>
+          <a:p>
+            <a:pPr>
+              <a:spcBef>
+                <a:spcPts val="600"/>
+              </a:spcBef>
+            </a:pPr>
             <a:r>
               <a:rPr lang="en-US" dirty="0">
-                <a:hlinkClick r:id="rId3"/>
-              </a:rPr>
-              <a:t>https://developer.clearent.com</a:t>
+                <a:hlinkClick r:id="rId4"/>
+              </a:rPr>
+              <a:t>https://www.linkedin.com/in/joegardner/</a:t>
             </a:r>
             <a:endParaRPr lang="en-US" dirty="0"/>
           </a:p>
-        </p:txBody>
-      </p:sp>
-      <p:pic>
-        <p:nvPicPr>
-          <p:cNvPr id="5" name="Picture 4">
-            <a:extLst>
-              <a:ext uri="{FF2B5EF4-FFF2-40B4-BE49-F238E27FC236}">
-                <a16:creationId xmlns:a16="http://schemas.microsoft.com/office/drawing/2014/main" id="{AF1BE8B3-3F76-49C3-BD47-85AEB310FE2F}"/>
-              </a:ext>
-            </a:extLst>
-          </p:cNvPr>
-          <p:cNvPicPr>
-            <a:picLocks noChangeAspect="1"/>
-          </p:cNvPicPr>
-          <p:nvPr/>
-        </p:nvPicPr>
-        <p:blipFill>
-          <a:blip r:embed="rId4">
-            <a:extLst>
-              <a:ext uri="{28A0092B-C50C-407E-A947-70E740481C1C}">
-                <a14:useLocalDpi xmlns:a14="http://schemas.microsoft.com/office/drawing/2010/main" val="0"/>
-              </a:ext>
-            </a:extLst>
-          </a:blip>
-          <a:stretch>
-            <a:fillRect/>
-          </a:stretch>
-        </p:blipFill>
-        <p:spPr>
-          <a:xfrm>
-            <a:off x="6986016" y="0"/>
-            <a:ext cx="5205984" cy="1395984"/>
-          </a:xfrm>
-          <a:prstGeom prst="rect">
-            <a:avLst/>
-          </a:prstGeom>
-        </p:spPr>
-      </p:pic>
+          <a:p>
+            <a:pPr>
+              <a:spcBef>
+                <a:spcPts val="600"/>
+              </a:spcBef>
+            </a:pPr>
+            <a:endParaRPr lang="en-US" dirty="0"/>
+          </a:p>
+        </p:txBody>
+      </p:sp>
       <p:sp>
         <p:nvSpPr>
           <p:cNvPr id="6" name="Footer Placeholder 5">
@@ -9091,7 +9072,7 @@
               <a:rPr lang="en-US" dirty="0">
                 <a:hlinkClick r:id="rId6"/>
               </a:rPr>
-              <a:t>jgardner@clearent.com</a:t>
+              <a:t>joegardner@gmail.com</a:t>
             </a:r>
             <a:r>
               <a:rPr lang="en-US" dirty="0"/>
@@ -9101,48 +9082,15 @@
               <a:rPr lang="en-US" dirty="0">
                 <a:hlinkClick r:id="rId7"/>
               </a:rPr>
-              <a:t>https://developer.clearent.com</a:t>
-            </a:r>
-            <a:endParaRPr lang="en-US" dirty="0"/>
-          </a:p>
-        </p:txBody>
-      </p:sp>
-      <p:pic>
-        <p:nvPicPr>
-          <p:cNvPr id="4" name="Picture 3">
-            <a:extLst>
-              <a:ext uri="{FF2B5EF4-FFF2-40B4-BE49-F238E27FC236}">
-                <a16:creationId xmlns:a16="http://schemas.microsoft.com/office/drawing/2014/main" id="{44BF22F4-B1DD-4633-9C2B-9CA4F4DAD0E4}"/>
-              </a:ext>
-            </a:extLst>
-          </p:cNvPr>
-          <p:cNvPicPr>
-            <a:picLocks noChangeAspect="1"/>
-          </p:cNvPicPr>
-          <p:nvPr/>
-        </p:nvPicPr>
-        <p:blipFill>
-          <a:blip r:embed="rId8">
-            <a:extLst>
-              <a:ext uri="{28A0092B-C50C-407E-A947-70E740481C1C}">
-                <a14:useLocalDpi xmlns:a14="http://schemas.microsoft.com/office/drawing/2010/main" val="0"/>
-              </a:ext>
-            </a:extLst>
-          </a:blip>
-          <a:stretch>
-            <a:fillRect/>
-          </a:stretch>
-        </p:blipFill>
-        <p:spPr>
-          <a:xfrm>
-            <a:off x="6986016" y="0"/>
-            <a:ext cx="5205984" cy="1395984"/>
-          </a:xfrm>
-          <a:prstGeom prst="rect">
-            <a:avLst/>
-          </a:prstGeom>
-        </p:spPr>
-      </p:pic>
+              <a:t>https://www.linkedin.com/in/joegardner</a:t>
+            </a:r>
+            <a:r>
+              <a:rPr lang="en-US" dirty="0"/>
+              <a:t> </a:t>
+            </a:r>
+          </a:p>
+        </p:txBody>
+      </p:sp>
       <p:sp>
         <p:nvSpPr>
           <p:cNvPr id="5" name="Footer Placeholder 4">
@@ -9335,6 +9283,34 @@
           </a:p>
         </p:txBody>
       </p:sp>
+      <p:sp>
+        <p:nvSpPr>
+          <p:cNvPr id="6" name="Footer Placeholder 5">
+            <a:extLst>
+              <a:ext uri="{FF2B5EF4-FFF2-40B4-BE49-F238E27FC236}">
+                <a16:creationId xmlns:a16="http://schemas.microsoft.com/office/drawing/2014/main" id="{4AB76E81-4120-4DED-9EE2-AC3A97E1D302}"/>
+              </a:ext>
+            </a:extLst>
+          </p:cNvPr>
+          <p:cNvSpPr>
+            <a:spLocks noGrp="1"/>
+          </p:cNvSpPr>
+          <p:nvPr>
+            <p:ph type="ftr" sz="quarter" idx="11"/>
+          </p:nvPr>
+        </p:nvSpPr>
+        <p:spPr/>
+        <p:txBody>
+          <a:bodyPr/>
+          <a:lstStyle/>
+          <a:p>
+            <a:r>
+              <a:rPr lang="en-US"/>
+              <a:t>https://github.com/joegardnr/TestingAspNetCore</a:t>
+            </a:r>
+          </a:p>
+        </p:txBody>
+      </p:sp>
       <p:pic>
         <p:nvPicPr>
           <p:cNvPr id="5" name="Picture 4">
@@ -9365,34 +9341,6 @@
           </a:prstGeom>
         </p:spPr>
       </p:pic>
-      <p:sp>
-        <p:nvSpPr>
-          <p:cNvPr id="6" name="Footer Placeholder 5">
-            <a:extLst>
-              <a:ext uri="{FF2B5EF4-FFF2-40B4-BE49-F238E27FC236}">
-                <a16:creationId xmlns:a16="http://schemas.microsoft.com/office/drawing/2014/main" id="{4AB76E81-4120-4DED-9EE2-AC3A97E1D302}"/>
-              </a:ext>
-            </a:extLst>
-          </p:cNvPr>
-          <p:cNvSpPr>
-            <a:spLocks noGrp="1"/>
-          </p:cNvSpPr>
-          <p:nvPr>
-            <p:ph type="ftr" sz="quarter" idx="11"/>
-          </p:nvPr>
-        </p:nvSpPr>
-        <p:spPr/>
-        <p:txBody>
-          <a:bodyPr/>
-          <a:lstStyle/>
-          <a:p>
-            <a:r>
-              <a:rPr lang="en-US"/>
-              <a:t>https://github.com/joegardnr/TestingAspNetCore</a:t>
-            </a:r>
-          </a:p>
-        </p:txBody>
-      </p:sp>
     </p:spTree>
     <p:extLst>
       <p:ext uri="{BB962C8B-B14F-4D97-AF65-F5344CB8AC3E}">
@@ -11188,12 +11136,7 @@
             <p:ph type="title"/>
           </p:nvPr>
         </p:nvSpPr>
-        <p:spPr>
-          <a:xfrm>
-            <a:off x="1097280" y="286603"/>
-            <a:ext cx="10058400" cy="1450757"/>
-          </a:xfrm>
-        </p:spPr>
+        <p:spPr/>
         <p:txBody>
           <a:bodyPr/>
           <a:lstStyle/>
@@ -11375,6 +11318,34 @@
               <a:t>https://nsubstitute.github.io/</a:t>
             </a:r>
             <a:endParaRPr lang="en-US" dirty="0"/>
+          </a:p>
+        </p:txBody>
+      </p:sp>
+      <p:sp>
+        <p:nvSpPr>
+          <p:cNvPr id="4" name="Footer Placeholder 3">
+            <a:extLst>
+              <a:ext uri="{FF2B5EF4-FFF2-40B4-BE49-F238E27FC236}">
+                <a16:creationId xmlns:a16="http://schemas.microsoft.com/office/drawing/2014/main" id="{D4669E1C-1E6D-4FBA-9F52-BD7B7241B290}"/>
+              </a:ext>
+            </a:extLst>
+          </p:cNvPr>
+          <p:cNvSpPr>
+            <a:spLocks noGrp="1"/>
+          </p:cNvSpPr>
+          <p:nvPr>
+            <p:ph type="ftr" sz="quarter" idx="11"/>
+          </p:nvPr>
+        </p:nvSpPr>
+        <p:spPr/>
+        <p:txBody>
+          <a:bodyPr/>
+          <a:lstStyle/>
+          <a:p>
+            <a:r>
+              <a:rPr lang="en-US"/>
+              <a:t>https://github.com/joegardnr/TestingAspNetCore</a:t>
+            </a:r>
           </a:p>
         </p:txBody>
       </p:sp>
@@ -11408,34 +11379,6 @@
           </a:prstGeom>
         </p:spPr>
       </p:pic>
-      <p:sp>
-        <p:nvSpPr>
-          <p:cNvPr id="4" name="Footer Placeholder 3">
-            <a:extLst>
-              <a:ext uri="{FF2B5EF4-FFF2-40B4-BE49-F238E27FC236}">
-                <a16:creationId xmlns:a16="http://schemas.microsoft.com/office/drawing/2014/main" id="{D4669E1C-1E6D-4FBA-9F52-BD7B7241B290}"/>
-              </a:ext>
-            </a:extLst>
-          </p:cNvPr>
-          <p:cNvSpPr>
-            <a:spLocks noGrp="1"/>
-          </p:cNvSpPr>
-          <p:nvPr>
-            <p:ph type="ftr" sz="quarter" idx="11"/>
-          </p:nvPr>
-        </p:nvSpPr>
-        <p:spPr/>
-        <p:txBody>
-          <a:bodyPr/>
-          <a:lstStyle/>
-          <a:p>
-            <a:r>
-              <a:rPr lang="en-US"/>
-              <a:t>https://github.com/joegardnr/TestingAspNetCore</a:t>
-            </a:r>
-          </a:p>
-        </p:txBody>
-      </p:sp>
     </p:spTree>
     <p:extLst>
       <p:ext uri="{BB962C8B-B14F-4D97-AF65-F5344CB8AC3E}">
@@ -11460,31 +11403,31 @@
         <a:sysClr val="window" lastClr="FFFFFF"/>
       </a:lt1>
       <a:dk2>
-        <a:srgbClr val="455F51"/>
+        <a:srgbClr val="344068"/>
       </a:dk2>
       <a:lt2>
-        <a:srgbClr val="E2DFCC"/>
+        <a:srgbClr val="D9E0E6"/>
       </a:lt2>
       <a:accent1>
-        <a:srgbClr val="99CB38"/>
+        <a:srgbClr val="1CADE4"/>
       </a:accent1>
       <a:accent2>
-        <a:srgbClr val="63A537"/>
+        <a:srgbClr val="2683C6"/>
       </a:accent2>
       <a:accent3>
-        <a:srgbClr val="37A76F"/>
+        <a:srgbClr val="28C4CC"/>
       </a:accent3>
       <a:accent4>
-        <a:srgbClr val="44C1A3"/>
+        <a:srgbClr val="42BA97"/>
       </a:accent4>
       <a:accent5>
-        <a:srgbClr val="4EB3CF"/>
+        <a:srgbClr val="3E8853"/>
       </a:accent5>
       <a:accent6>
-        <a:srgbClr val="51C3F9"/>
+        <a:srgbClr val="62A39F"/>
       </a:accent6>
       <a:hlink>
-        <a:srgbClr val="6B9F25"/>
+        <a:srgbClr val="6EAC1C"/>
       </a:hlink>
       <a:folHlink>
         <a:srgbClr val="B26B02"/>
@@ -11726,7 +11669,7 @@
   <a:extraClrSchemeLst/>
   <a:extLst>
     <a:ext uri="{05A4C25C-085E-4340-85A3-A5531E510DB2}">
-      <thm15:themeFamily xmlns:thm15="http://schemas.microsoft.com/office/thememl/2012/main" name="Retrospect" id="{5F128B03-DCCA-4EEB-AB3B-CF2899314A46}" vid="{D26EA377-59BD-4C9C-9D94-EE8416EE4C79}"/>
+      <thm15:themeFamily xmlns:thm15="http://schemas.microsoft.com/office/thememl/2012/main" name="Retrospect" id="{5F128B03-DCCA-4EEB-AB3B-CF2899314A46}" vid="{9CC26709-368C-4D72-9060-94E5B3FF3CD6}"/>
     </a:ext>
   </a:extLst>
 </a:theme>

</xml_diff>

<commit_message>
Update to ASP.Net Core 6.0
</commit_message>
<xml_diff>
--- a/TestingASPNetCore.pptx
+++ b/TestingASPNetCore.pptx
@@ -18,12 +18,12 @@
     <p:sldId id="260" r:id="rId9"/>
     <p:sldId id="263" r:id="rId10"/>
     <p:sldId id="261" r:id="rId11"/>
-    <p:sldId id="264" r:id="rId12"/>
+    <p:sldId id="276" r:id="rId12"/>
     <p:sldId id="265" r:id="rId13"/>
     <p:sldId id="271" r:id="rId14"/>
-    <p:sldId id="269" r:id="rId15"/>
-    <p:sldId id="272" r:id="rId16"/>
-    <p:sldId id="267" r:id="rId17"/>
+    <p:sldId id="279" r:id="rId15"/>
+    <p:sldId id="278" r:id="rId16"/>
+    <p:sldId id="272" r:id="rId17"/>
   </p:sldIdLst>
   <p:sldSz cx="12192000" cy="6858000"/>
   <p:notesSz cx="6858000" cy="9144000"/>
@@ -2866,7 +2866,7 @@
           <a:p>
             <a:fld id="{7B950E3B-A481-48AE-8D69-75E603211DD4}" type="datetimeFigureOut">
               <a:rPr lang="en-US" smtClean="0"/>
-              <a:t>10/6/2020</a:t>
+              <a:t>8/15/2022</a:t>
             </a:fld>
             <a:endParaRPr lang="en-US"/>
           </a:p>
@@ -3177,10 +3177,7 @@
           <a:bodyPr/>
           <a:lstStyle/>
           <a:p>
-            <a:r>
-              <a:rPr lang="en-US" dirty="0"/>
-              <a:t>Yes, Billy the intern counts as a human. Automated tests are run by the computer, not a person.</a:t>
-            </a:r>
+            <a:endParaRPr lang="en-US" dirty="0"/>
           </a:p>
         </p:txBody>
       </p:sp>
@@ -3201,7 +3198,7 @@
           <a:p>
             <a:fld id="{ACA8D5F8-15F5-4400-84B8-C846AF49918D}" type="slidenum">
               <a:rPr lang="en-US" smtClean="0"/>
-              <a:t>3</a:t>
+              <a:t>2</a:t>
             </a:fld>
             <a:endParaRPr lang="en-US"/>
           </a:p>
@@ -3210,7 +3207,7 @@
     </p:spTree>
     <p:extLst>
       <p:ext uri="{BB962C8B-B14F-4D97-AF65-F5344CB8AC3E}">
-        <p14:creationId xmlns:p14="http://schemas.microsoft.com/office/powerpoint/2010/main" val="3888505592"/>
+        <p14:creationId xmlns:p14="http://schemas.microsoft.com/office/powerpoint/2010/main" val="607968368"/>
       </p:ext>
     </p:extLst>
   </p:cSld>
@@ -3266,7 +3263,7 @@
           <a:p>
             <a:r>
               <a:rPr lang="en-US" dirty="0"/>
-              <a:t>Everybody is testing their code, but Automated Testing is inherently better than doing it manually.</a:t>
+              <a:t>Yes, Billy the intern counts as a human. Automated tests are run by the computer, not a person.</a:t>
             </a:r>
           </a:p>
         </p:txBody>
@@ -3288,7 +3285,7 @@
           <a:p>
             <a:fld id="{ACA8D5F8-15F5-4400-84B8-C846AF49918D}" type="slidenum">
               <a:rPr lang="en-US" smtClean="0"/>
-              <a:t>4</a:t>
+              <a:t>3</a:t>
             </a:fld>
             <a:endParaRPr lang="en-US"/>
           </a:p>
@@ -3297,7 +3294,7 @@
     </p:spTree>
     <p:extLst>
       <p:ext uri="{BB962C8B-B14F-4D97-AF65-F5344CB8AC3E}">
-        <p14:creationId xmlns:p14="http://schemas.microsoft.com/office/powerpoint/2010/main" val="3347804594"/>
+        <p14:creationId xmlns:p14="http://schemas.microsoft.com/office/powerpoint/2010/main" val="3888505592"/>
       </p:ext>
     </p:extLst>
   </p:cSld>
@@ -3353,7 +3350,7 @@
           <a:p>
             <a:r>
               <a:rPr lang="en-US" dirty="0"/>
-              <a:t>10x Engineers are the new Chuck Norris</a:t>
+              <a:t>Everybody is testing their code, but Automated Testing is inherently better than doing it manually.</a:t>
             </a:r>
           </a:p>
         </p:txBody>
@@ -3375,7 +3372,7 @@
           <a:p>
             <a:fld id="{ACA8D5F8-15F5-4400-84B8-C846AF49918D}" type="slidenum">
               <a:rPr lang="en-US" smtClean="0"/>
-              <a:t>5</a:t>
+              <a:t>4</a:t>
             </a:fld>
             <a:endParaRPr lang="en-US"/>
           </a:p>
@@ -3384,7 +3381,7 @@
     </p:spTree>
     <p:extLst>
       <p:ext uri="{BB962C8B-B14F-4D97-AF65-F5344CB8AC3E}">
-        <p14:creationId xmlns:p14="http://schemas.microsoft.com/office/powerpoint/2010/main" val="3937882778"/>
+        <p14:creationId xmlns:p14="http://schemas.microsoft.com/office/powerpoint/2010/main" val="3347804594"/>
       </p:ext>
     </p:extLst>
   </p:cSld>
@@ -3440,6 +3437,93 @@
           <a:p>
             <a:r>
               <a:rPr lang="en-US" dirty="0"/>
+              <a:t>10x Engineers are the new Chuck Norris</a:t>
+            </a:r>
+          </a:p>
+        </p:txBody>
+      </p:sp>
+      <p:sp>
+        <p:nvSpPr>
+          <p:cNvPr id="4" name="Slide Number Placeholder 3"/>
+          <p:cNvSpPr>
+            <a:spLocks noGrp="1"/>
+          </p:cNvSpPr>
+          <p:nvPr>
+            <p:ph type="sldNum" sz="quarter" idx="5"/>
+          </p:nvPr>
+        </p:nvSpPr>
+        <p:spPr/>
+        <p:txBody>
+          <a:bodyPr/>
+          <a:lstStyle/>
+          <a:p>
+            <a:fld id="{ACA8D5F8-15F5-4400-84B8-C846AF49918D}" type="slidenum">
+              <a:rPr lang="en-US" smtClean="0"/>
+              <a:t>5</a:t>
+            </a:fld>
+            <a:endParaRPr lang="en-US"/>
+          </a:p>
+        </p:txBody>
+      </p:sp>
+    </p:spTree>
+    <p:extLst>
+      <p:ext uri="{BB962C8B-B14F-4D97-AF65-F5344CB8AC3E}">
+        <p14:creationId xmlns:p14="http://schemas.microsoft.com/office/powerpoint/2010/main" val="3937882778"/>
+      </p:ext>
+    </p:extLst>
+  </p:cSld>
+  <p:clrMapOvr>
+    <a:masterClrMapping/>
+  </p:clrMapOvr>
+</p:notes>
+</file>
+
+<file path=ppt/notesSlides/notesSlide5.xml><?xml version="1.0" encoding="utf-8"?>
+<p:notes xmlns:a="http://schemas.openxmlformats.org/drawingml/2006/main" xmlns:r="http://schemas.openxmlformats.org/officeDocument/2006/relationships" xmlns:p="http://schemas.openxmlformats.org/presentationml/2006/main">
+  <p:cSld>
+    <p:spTree>
+      <p:nvGrpSpPr>
+        <p:cNvPr id="1" name=""/>
+        <p:cNvGrpSpPr/>
+        <p:nvPr/>
+      </p:nvGrpSpPr>
+      <p:grpSpPr>
+        <a:xfrm>
+          <a:off x="0" y="0"/>
+          <a:ext cx="0" cy="0"/>
+          <a:chOff x="0" y="0"/>
+          <a:chExt cx="0" cy="0"/>
+        </a:xfrm>
+      </p:grpSpPr>
+      <p:sp>
+        <p:nvSpPr>
+          <p:cNvPr id="2" name="Slide Image Placeholder 1"/>
+          <p:cNvSpPr>
+            <a:spLocks noGrp="1" noRot="1" noChangeAspect="1"/>
+          </p:cNvSpPr>
+          <p:nvPr>
+            <p:ph type="sldImg"/>
+          </p:nvPr>
+        </p:nvSpPr>
+        <p:spPr/>
+      </p:sp>
+      <p:sp>
+        <p:nvSpPr>
+          <p:cNvPr id="3" name="Notes Placeholder 2"/>
+          <p:cNvSpPr>
+            <a:spLocks noGrp="1"/>
+          </p:cNvSpPr>
+          <p:nvPr>
+            <p:ph type="body" idx="1"/>
+          </p:nvPr>
+        </p:nvSpPr>
+        <p:spPr/>
+        <p:txBody>
+          <a:bodyPr/>
+          <a:lstStyle/>
+          <a:p>
+            <a:r>
+              <a:rPr lang="en-US" dirty="0"/>
               <a:t>It’s harder to write Unit tests AFTER you’ve written the code.  But IT/ATs are still better than no tests.</a:t>
             </a:r>
           </a:p>
@@ -3481,7 +3565,7 @@
 </p:notes>
 </file>
 
-<file path=ppt/notesSlides/notesSlide5.xml><?xml version="1.0" encoding="utf-8"?>
+<file path=ppt/notesSlides/notesSlide6.xml><?xml version="1.0" encoding="utf-8"?>
 <p:notes xmlns:a="http://schemas.openxmlformats.org/drawingml/2006/main" xmlns:r="http://schemas.openxmlformats.org/officeDocument/2006/relationships" xmlns:p="http://schemas.openxmlformats.org/presentationml/2006/main">
   <p:cSld>
     <p:spTree>
@@ -3794,7 +3878,7 @@
           <a:p>
             <a:fld id="{0BCF7C18-C7ED-4823-B3E1-8D5A44B798DB}" type="datetime1">
               <a:rPr lang="en-US" smtClean="0"/>
-              <a:t>10/6/2020</a:t>
+              <a:t>8/15/2022</a:t>
             </a:fld>
             <a:endParaRPr lang="en-US"/>
           </a:p>
@@ -4009,7 +4093,7 @@
           <a:p>
             <a:fld id="{325D1947-6315-4708-818C-C03C9BE7AED5}" type="datetime1">
               <a:rPr lang="en-US" smtClean="0"/>
-              <a:t>10/6/2020</a:t>
+              <a:t>8/15/2022</a:t>
             </a:fld>
             <a:endParaRPr lang="en-US"/>
           </a:p>
@@ -4268,7 +4352,7 @@
           <a:p>
             <a:fld id="{6ED82F84-3386-4F72-B15A-46F0008D1DFF}" type="datetime1">
               <a:rPr lang="en-US" smtClean="0"/>
-              <a:t>10/6/2020</a:t>
+              <a:t>8/15/2022</a:t>
             </a:fld>
             <a:endParaRPr lang="en-US"/>
           </a:p>
@@ -4441,7 +4525,7 @@
           <a:p>
             <a:fld id="{EE34D590-BB32-4380-B38B-4A11F5BAD045}" type="datetime1">
               <a:rPr lang="en-US" smtClean="0"/>
-              <a:t>10/6/2020</a:t>
+              <a:t>8/15/2022</a:t>
             </a:fld>
             <a:endParaRPr lang="en-US"/>
           </a:p>
@@ -4787,7 +4871,7 @@
           <a:p>
             <a:fld id="{90D20639-7E00-47E8-9CA4-2481DFE25361}" type="datetime1">
               <a:rPr lang="en-US" smtClean="0"/>
-              <a:t>10/6/2020</a:t>
+              <a:t>8/15/2022</a:t>
             </a:fld>
             <a:endParaRPr lang="en-US"/>
           </a:p>
@@ -5065,7 +5149,7 @@
           <a:p>
             <a:fld id="{FCC8C201-45DE-4DB8-AE17-F76C07FE6801}" type="datetime1">
               <a:rPr lang="en-US" smtClean="0"/>
-              <a:t>10/6/2020</a:t>
+              <a:t>8/15/2022</a:t>
             </a:fld>
             <a:endParaRPr lang="en-US"/>
           </a:p>
@@ -5447,7 +5531,7 @@
           <a:p>
             <a:fld id="{2F42A3A9-AE8C-4613-BBD9-28F0176DE020}" type="datetime1">
               <a:rPr lang="en-US" smtClean="0"/>
-              <a:t>10/6/2020</a:t>
+              <a:t>8/15/2022</a:t>
             </a:fld>
             <a:endParaRPr lang="en-US"/>
           </a:p>
@@ -5568,7 +5652,7 @@
           <a:p>
             <a:fld id="{ECFCE427-A859-4E51-95E7-01FB72063022}" type="datetime1">
               <a:rPr lang="en-US" smtClean="0"/>
-              <a:t>10/6/2020</a:t>
+              <a:t>8/15/2022</a:t>
             </a:fld>
             <a:endParaRPr lang="en-US"/>
           </a:p>
@@ -5742,7 +5826,7 @@
           <a:p>
             <a:fld id="{29CD1139-554B-4DA0-B888-208294307114}" type="datetime1">
               <a:rPr lang="en-US" smtClean="0"/>
-              <a:t>10/6/2020</a:t>
+              <a:t>8/15/2022</a:t>
             </a:fld>
             <a:endParaRPr lang="en-US"/>
           </a:p>
@@ -6099,7 +6183,7 @@
           <a:p>
             <a:fld id="{09C0076D-EDB8-4877-9053-F9351FC17A95}" type="datetime1">
               <a:rPr lang="en-US" smtClean="0"/>
-              <a:t>10/6/2020</a:t>
+              <a:t>8/15/2022</a:t>
             </a:fld>
             <a:endParaRPr lang="en-US"/>
           </a:p>
@@ -6479,7 +6563,7 @@
           <a:p>
             <a:fld id="{4BD2C180-8F8A-4C74-950D-3A37A8651DBC}" type="datetime1">
               <a:rPr lang="en-US" smtClean="0"/>
-              <a:t>10/6/2020</a:t>
+              <a:t>8/15/2022</a:t>
             </a:fld>
             <a:endParaRPr lang="en-US"/>
           </a:p>
@@ -6769,7 +6853,7 @@
           <a:p>
             <a:fld id="{001FBD98-E3F9-4E7F-9052-3E28BDC0EF07}" type="datetime1">
               <a:rPr lang="en-US" smtClean="0"/>
-              <a:t>10/6/2020</a:t>
+              <a:t>8/15/2022</a:t>
             </a:fld>
             <a:endParaRPr lang="en-US"/>
           </a:p>
@@ -7298,6 +7382,42 @@
           <a:chExt cx="0" cy="0"/>
         </a:xfrm>
       </p:grpSpPr>
+      <p:pic>
+        <p:nvPicPr>
+          <p:cNvPr id="7" name="Picture 6" descr="Qr code&#10;&#10;Description automatically generated">
+            <a:extLst>
+              <a:ext uri="{FF2B5EF4-FFF2-40B4-BE49-F238E27FC236}">
+                <a16:creationId xmlns:a16="http://schemas.microsoft.com/office/drawing/2014/main" id="{A42AC9DF-18DC-F567-9623-E49672AD6B2D}"/>
+              </a:ext>
+            </a:extLst>
+          </p:cNvPr>
+          <p:cNvPicPr>
+            <a:picLocks noChangeAspect="1"/>
+          </p:cNvPicPr>
+          <p:nvPr/>
+        </p:nvPicPr>
+        <p:blipFill>
+          <a:blip r:embed="rId2">
+            <a:extLst>
+              <a:ext uri="{28A0092B-C50C-407E-A947-70E740481C1C}">
+                <a14:useLocalDpi xmlns:a14="http://schemas.microsoft.com/office/drawing/2010/main" val="0"/>
+              </a:ext>
+            </a:extLst>
+          </a:blip>
+          <a:stretch>
+            <a:fillRect/>
+          </a:stretch>
+        </p:blipFill>
+        <p:spPr>
+          <a:xfrm>
+            <a:off x="9194800" y="4365686"/>
+            <a:ext cx="1960880" cy="1960880"/>
+          </a:xfrm>
+          <a:prstGeom prst="rect">
+            <a:avLst/>
+          </a:prstGeom>
+        </p:spPr>
+      </p:pic>
       <p:sp>
         <p:nvSpPr>
           <p:cNvPr id="2" name="Title 1">
@@ -7370,7 +7490,7 @@
             </a:pPr>
             <a:r>
               <a:rPr lang="en-US" dirty="0"/>
-              <a:t>Joe Gardner | Lead Developer | Clearent</a:t>
+              <a:t>Joe Gardner | Technical Manager| Carvana</a:t>
             </a:r>
           </a:p>
           <a:p>
@@ -7380,7 +7500,7 @@
               </a:spcBef>
             </a:pPr>
             <a:endParaRPr lang="en-US" dirty="0">
-              <a:hlinkClick r:id="rId2"/>
+              <a:hlinkClick r:id="rId3"/>
             </a:endParaRPr>
           </a:p>
           <a:p>
@@ -7390,12 +7510,9 @@
               </a:spcBef>
             </a:pPr>
             <a:r>
-              <a:rPr lang="en-US" dirty="0">
-                <a:hlinkClick r:id="rId3"/>
-              </a:rPr>
-              <a:t>joegardner@gmail.com</a:t>
-            </a:r>
-            <a:endParaRPr lang="en-US" dirty="0"/>
+              <a:rPr lang="en-US" dirty="0"/>
+              <a:t>Joe.Gardner@carvana.com</a:t>
+            </a:r>
           </a:p>
           <a:p>
             <a:pPr>
@@ -7530,7 +7647,7 @@
           <a:p>
             <a:r>
               <a:rPr lang="en-US" dirty="0"/>
-              <a:t>Unit Tests</a:t>
+              <a:t>“Unit” Tests</a:t>
             </a:r>
           </a:p>
         </p:txBody>
@@ -7616,7 +7733,18 @@
           <a:p>
             <a:r>
               <a:rPr lang="en-US" dirty="0" err="1"/>
-              <a:t>Microsoft.AspNetCore.TestHost</a:t>
+              <a:t>WebApplicationFactory</a:t>
+            </a:r>
+            <a:r>
+              <a:rPr lang="en-US" dirty="0"/>
+              <a:t> in</a:t>
+            </a:r>
+            <a:br>
+              <a:rPr lang="en-US" dirty="0"/>
+            </a:br>
+            <a:r>
+              <a:rPr lang="en-US" dirty="0" err="1"/>
+              <a:t>Microsoft.AspNetCore.Mvc.Testing</a:t>
             </a:r>
             <a:endParaRPr lang="en-US" b="1" dirty="0"/>
           </a:p>
@@ -7662,7 +7790,7 @@
           <a:p>
             <a:r>
               <a:rPr lang="en-US" dirty="0"/>
-              <a:t>Actually test your Routes!</a:t>
+              <a:t>Test your Routes!</a:t>
             </a:r>
           </a:p>
           <a:p>
@@ -7682,15 +7810,6 @@
               <a:rPr lang="en-US" dirty="0"/>
               <a:t>Reliable “Integration” Tests during Build!</a:t>
             </a:r>
-          </a:p>
-          <a:p>
-            <a:r>
-              <a:rPr lang="en-US" dirty="0"/>
-              <a:t>Exclamation Points!!!</a:t>
-            </a:r>
-          </a:p>
-          <a:p>
-            <a:endParaRPr lang="en-US" dirty="0"/>
           </a:p>
         </p:txBody>
       </p:sp>
@@ -7812,25 +7931,7 @@
                 </a:solidFill>
                 <a:latin typeface="Consolas" panose="020B0609020204030204" pitchFamily="49" charset="0"/>
               </a:rPr>
-              <a:t>WebHostBuilder</a:t>
-            </a:r>
-            <a:r>
-              <a:rPr lang="en-US" sz="1400" dirty="0">
-                <a:solidFill>
-                  <a:srgbClr val="000000"/>
-                </a:solidFill>
-                <a:latin typeface="Consolas" panose="020B0609020204030204" pitchFamily="49" charset="0"/>
-              </a:rPr>
-              <a:t>().</a:t>
-            </a:r>
-            <a:r>
-              <a:rPr lang="en-US" sz="1400" dirty="0" err="1">
-                <a:solidFill>
-                  <a:srgbClr val="000000"/>
-                </a:solidFill>
-                <a:latin typeface="Consolas" panose="020B0609020204030204" pitchFamily="49" charset="0"/>
-              </a:rPr>
-              <a:t>UseStartup</a:t>
+              <a:t>WebApplicationFactory</a:t>
             </a:r>
             <a:r>
               <a:rPr lang="en-US" sz="1400" dirty="0">
@@ -7865,96 +7966,16 @@
                 </a:solidFill>
                 <a:latin typeface="Consolas" panose="020B0609020204030204" pitchFamily="49" charset="0"/>
               </a:rPr>
-              <a:t> server = </a:t>
-            </a:r>
-            <a:r>
-              <a:rPr lang="en-US" sz="1400" dirty="0">
-                <a:solidFill>
-                  <a:srgbClr val="0000FF"/>
+              <a:t> client = </a:t>
+            </a:r>
+            <a:r>
+              <a:rPr lang="en-US" sz="1400" dirty="0" err="1">
+                <a:solidFill>
+                  <a:srgbClr val="000000"/>
                 </a:solidFill>
                 <a:latin typeface="Consolas" panose="020B0609020204030204" pitchFamily="49" charset="0"/>
               </a:rPr>
-              <a:t>new</a:t>
-            </a:r>
-            <a:r>
-              <a:rPr lang="en-US" sz="1400" dirty="0">
-                <a:solidFill>
-                  <a:srgbClr val="000000"/>
-                </a:solidFill>
-                <a:latin typeface="Consolas" panose="020B0609020204030204" pitchFamily="49" charset="0"/>
-              </a:rPr>
-              <a:t> </a:t>
-            </a:r>
-            <a:r>
-              <a:rPr lang="en-US" sz="1400" dirty="0" err="1">
-                <a:solidFill>
-                  <a:srgbClr val="000000"/>
-                </a:solidFill>
-                <a:latin typeface="Consolas" panose="020B0609020204030204" pitchFamily="49" charset="0"/>
-              </a:rPr>
-              <a:t>TestServer</a:t>
-            </a:r>
-            <a:r>
-              <a:rPr lang="en-US" sz="1400" dirty="0">
-                <a:solidFill>
-                  <a:srgbClr val="000000"/>
-                </a:solidFill>
-                <a:latin typeface="Consolas" panose="020B0609020204030204" pitchFamily="49" charset="0"/>
-              </a:rPr>
-              <a:t>(</a:t>
-            </a:r>
-            <a:r>
-              <a:rPr lang="en-US" sz="1400" dirty="0" err="1">
-                <a:solidFill>
-                  <a:srgbClr val="000000"/>
-                </a:solidFill>
-                <a:latin typeface="Consolas" panose="020B0609020204030204" pitchFamily="49" charset="0"/>
-              </a:rPr>
-              <a:t>webHost</a:t>
-            </a:r>
-            <a:r>
-              <a:rPr lang="en-US" sz="1400" dirty="0">
-                <a:solidFill>
-                  <a:srgbClr val="000000"/>
-                </a:solidFill>
-                <a:latin typeface="Consolas" panose="020B0609020204030204" pitchFamily="49" charset="0"/>
-              </a:rPr>
-              <a:t>);</a:t>
-            </a:r>
-          </a:p>
-          <a:p>
-            <a:pPr marL="0" indent="0">
-              <a:spcBef>
-                <a:spcPts val="200"/>
-              </a:spcBef>
-              <a:buNone/>
-            </a:pPr>
-            <a:r>
-              <a:rPr lang="en-US" sz="1400" dirty="0">
-                <a:solidFill>
-                  <a:srgbClr val="0000FF"/>
-                </a:solidFill>
-                <a:latin typeface="Consolas" panose="020B0609020204030204" pitchFamily="49" charset="0"/>
-              </a:rPr>
-              <a:t>var</a:t>
-            </a:r>
-            <a:r>
-              <a:rPr lang="en-US" sz="1400" dirty="0">
-                <a:solidFill>
-                  <a:srgbClr val="000000"/>
-                </a:solidFill>
-                <a:latin typeface="Consolas" panose="020B0609020204030204" pitchFamily="49" charset="0"/>
-              </a:rPr>
-              <a:t> client = </a:t>
-            </a:r>
-            <a:r>
-              <a:rPr lang="en-US" sz="1400" dirty="0" err="1">
-                <a:solidFill>
-                  <a:srgbClr val="000000"/>
-                </a:solidFill>
-                <a:latin typeface="Consolas" panose="020B0609020204030204" pitchFamily="49" charset="0"/>
-              </a:rPr>
-              <a:t>server.CreateClient</a:t>
+              <a:t>webHost.CreateClient</a:t>
             </a:r>
             <a:r>
               <a:rPr lang="en-US" sz="1400" dirty="0">
@@ -8357,7 +8378,7 @@
     </p:spTree>
     <p:extLst>
       <p:ext uri="{BB962C8B-B14F-4D97-AF65-F5344CB8AC3E}">
-        <p14:creationId xmlns:p14="http://schemas.microsoft.com/office/powerpoint/2010/main" val="326695647"/>
+        <p14:creationId xmlns:p14="http://schemas.microsoft.com/office/powerpoint/2010/main" val="1043874334"/>
       </p:ext>
     </p:extLst>
   </p:cSld>
@@ -8435,19 +8456,11 @@
           <a:p>
             <a:r>
               <a:rPr lang="en-US" strike="sngStrike" dirty="0"/>
-              <a:t>Unit</a:t>
+              <a:t>Integration</a:t>
             </a:r>
             <a:r>
               <a:rPr lang="en-US" dirty="0"/>
-              <a:t> </a:t>
-            </a:r>
-            <a:r>
-              <a:rPr lang="en-US" strike="sngStrike" dirty="0"/>
-              <a:t>Integration</a:t>
-            </a:r>
-            <a:r>
-              <a:rPr lang="en-US" dirty="0"/>
-              <a:t> Hybrid Tests?</a:t>
+              <a:t> Unit Tests?</a:t>
             </a:r>
           </a:p>
         </p:txBody>
@@ -8533,7 +8546,7 @@
           <a:p>
             <a:r>
               <a:rPr lang="en-US" dirty="0"/>
-              <a:t>What else is there?</a:t>
+              <a:t>Client Side Testing (in a Real Browser)</a:t>
             </a:r>
           </a:p>
         </p:txBody>
@@ -8551,23 +8564,25 @@
             <a:spLocks noGrp="1"/>
           </p:cNvSpPr>
           <p:nvPr>
-            <p:ph idx="1"/>
+            <p:ph sz="half" idx="1"/>
           </p:nvPr>
         </p:nvSpPr>
         <p:spPr/>
         <p:txBody>
-          <a:bodyPr/>
+          <a:bodyPr>
+            <a:normAutofit/>
+          </a:bodyPr>
           <a:lstStyle/>
           <a:p>
             <a:r>
               <a:rPr lang="en-US" dirty="0"/>
-              <a:t>Alba - </a:t>
+              <a:t>Selenium - </a:t>
             </a:r>
             <a:r>
               <a:rPr lang="en-US" dirty="0">
                 <a:hlinkClick r:id="rId2"/>
               </a:rPr>
-              <a:t>http://jasperfx.github.io/alba/</a:t>
+              <a:t>https://www.seleniumhq.org/</a:t>
             </a:r>
             <a:endParaRPr lang="en-US" dirty="0"/>
           </a:p>
@@ -8575,27 +8590,34 @@
             <a:pPr lvl="1"/>
             <a:r>
               <a:rPr lang="en-US" dirty="0"/>
-              <a:t>Wrapper / Extension Methods for </a:t>
+              <a:t>Programmatically drive a web browser and capture results</a:t>
+            </a:r>
+          </a:p>
+          <a:p>
+            <a:pPr lvl="1"/>
+            <a:r>
+              <a:rPr lang="en-US" dirty="0"/>
+              <a:t>Write tests in many languages (C#, Java, </a:t>
             </a:r>
             <a:r>
               <a:rPr lang="en-US" dirty="0" err="1"/>
-              <a:t>TestServer</a:t>
+              <a:t>etc</a:t>
             </a:r>
             <a:r>
               <a:rPr lang="en-US" dirty="0"/>
-              <a:t>.</a:t>
+              <a:t>)</a:t>
             </a:r>
           </a:p>
           <a:p>
             <a:r>
               <a:rPr lang="en-US" dirty="0"/>
-              <a:t>Postman - </a:t>
+              <a:t>Cypress - </a:t>
             </a:r>
             <a:r>
               <a:rPr lang="en-US" dirty="0">
                 <a:hlinkClick r:id="rId3"/>
               </a:rPr>
-              <a:t>https://www.getpostman.com/downloads/</a:t>
+              <a:t>https://www.cypress.io/</a:t>
             </a:r>
             <a:endParaRPr lang="en-US" dirty="0"/>
           </a:p>
@@ -8603,19 +8625,26 @@
             <a:pPr lvl="1"/>
             <a:r>
               <a:rPr lang="en-US" dirty="0"/>
-              <a:t>Desktop GUI for Rest APIs</a:t>
-            </a:r>
-          </a:p>
-          <a:p>
+              <a:t>In-browser tests</a:t>
+            </a:r>
+          </a:p>
+          <a:p>
+            <a:pPr lvl="1"/>
             <a:r>
               <a:rPr lang="en-US" dirty="0"/>
-              <a:t>Selenium - </a:t>
+              <a:t>Write tests in Typescript</a:t>
+            </a:r>
+          </a:p>
+          <a:p>
+            <a:r>
+              <a:rPr lang="en-US" dirty="0"/>
+              <a:t>Playwright - </a:t>
             </a:r>
             <a:r>
               <a:rPr lang="en-US" dirty="0">
                 <a:hlinkClick r:id="rId4"/>
               </a:rPr>
-              <a:t>https://www.seleniumhq.org/</a:t>
+              <a:t>https://playwright.dev/dotnet/</a:t>
             </a:r>
             <a:endParaRPr lang="en-US" dirty="0"/>
           </a:p>
@@ -8623,34 +8652,62 @@
             <a:pPr lvl="1"/>
             <a:r>
               <a:rPr lang="en-US" dirty="0"/>
-              <a:t>Programmatically drive a web browser and capture results</a:t>
-            </a:r>
-          </a:p>
-          <a:p>
+              <a:t>Programmatically drive a web browser (different implementation than Selenium)</a:t>
+            </a:r>
+          </a:p>
+          <a:p>
+            <a:pPr lvl="1"/>
             <a:r>
               <a:rPr lang="en-US" dirty="0"/>
-              <a:t>Cypress - </a:t>
-            </a:r>
-            <a:r>
-              <a:rPr lang="en-US" dirty="0">
-                <a:hlinkClick r:id="rId5"/>
-              </a:rPr>
-              <a:t>https://www.cypress.io/</a:t>
-            </a:r>
-            <a:endParaRPr lang="en-US" dirty="0"/>
+              <a:t>Write tests in many languages (C#, Java, </a:t>
+            </a:r>
+            <a:r>
+              <a:rPr lang="en-US" dirty="0" err="1"/>
+              <a:t>etc</a:t>
+            </a:r>
+            <a:r>
+              <a:rPr lang="en-US" dirty="0"/>
+              <a:t>)</a:t>
+            </a:r>
           </a:p>
           <a:p>
             <a:pPr lvl="1"/>
             <a:r>
               <a:rPr lang="en-US" dirty="0"/>
-              <a:t>In-browser tests</a:t>
-            </a:r>
-          </a:p>
-          <a:p>
-            <a:endParaRPr lang="en-US" dirty="0"/>
-          </a:p>
-        </p:txBody>
-      </p:sp>
+              <a:t>Automatic Wait!</a:t>
+            </a:r>
+          </a:p>
+        </p:txBody>
+      </p:sp>
+      <p:pic>
+        <p:nvPicPr>
+          <p:cNvPr id="10" name="Content Placeholder 9">
+            <a:extLst>
+              <a:ext uri="{FF2B5EF4-FFF2-40B4-BE49-F238E27FC236}">
+                <a16:creationId xmlns:a16="http://schemas.microsoft.com/office/drawing/2014/main" id="{249A8722-9B75-BDFB-5DE0-126708731588}"/>
+              </a:ext>
+            </a:extLst>
+          </p:cNvPr>
+          <p:cNvPicPr>
+            <a:picLocks noGrp="1" noChangeAspect="1"/>
+          </p:cNvPicPr>
+          <p:nvPr>
+            <p:ph sz="half" idx="2"/>
+          </p:nvPr>
+        </p:nvPicPr>
+        <p:blipFill>
+          <a:blip r:embed="rId5"/>
+          <a:stretch>
+            <a:fillRect/>
+          </a:stretch>
+        </p:blipFill>
+        <p:spPr>
+          <a:xfrm>
+            <a:off x="6218555" y="4402739"/>
+            <a:ext cx="4937125" cy="1633049"/>
+          </a:xfrm>
+        </p:spPr>
+      </p:pic>
       <p:sp>
         <p:nvSpPr>
           <p:cNvPr id="4" name="Footer Placeholder 3">
@@ -8714,7 +8771,7 @@
           <p:cNvPr id="2" name="Title 1">
             <a:extLst>
               <a:ext uri="{FF2B5EF4-FFF2-40B4-BE49-F238E27FC236}">
-                <a16:creationId xmlns:a16="http://schemas.microsoft.com/office/drawing/2014/main" id="{F1274AEF-761D-441A-9940-98BBE6627DDD}"/>
+                <a16:creationId xmlns:a16="http://schemas.microsoft.com/office/drawing/2014/main" id="{71E6B0E8-E4C6-41F5-BD9B-414D4DF6CC8B}"/>
               </a:ext>
             </a:extLst>
           </p:cNvPr>
@@ -8732,7 +8789,7 @@
           <a:p>
             <a:r>
               <a:rPr lang="en-US" dirty="0"/>
-              <a:t>Opinions / Advice</a:t>
+              <a:t>Playwright!</a:t>
             </a:r>
           </a:p>
         </p:txBody>
@@ -8742,7 +8799,7 @@
           <p:cNvPr id="3" name="Content Placeholder 2">
             <a:extLst>
               <a:ext uri="{FF2B5EF4-FFF2-40B4-BE49-F238E27FC236}">
-                <a16:creationId xmlns:a16="http://schemas.microsoft.com/office/drawing/2014/main" id="{C4B6469A-79A3-4650-AC03-49DA3D6D9901}"/>
+                <a16:creationId xmlns:a16="http://schemas.microsoft.com/office/drawing/2014/main" id="{88E7E88C-A347-45E3-9DD6-336E714CEDA6}"/>
               </a:ext>
             </a:extLst>
           </p:cNvPr>
@@ -8750,7 +8807,7 @@
             <a:spLocks noGrp="1"/>
           </p:cNvSpPr>
           <p:nvPr>
-            <p:ph idx="1"/>
+            <p:ph sz="half" idx="1"/>
           </p:nvPr>
         </p:nvSpPr>
         <p:spPr/>
@@ -8762,116 +8819,66 @@
           <a:p>
             <a:r>
               <a:rPr lang="en-US" dirty="0"/>
-              <a:t>Arrange / Act / Assert</a:t>
+              <a:t>Cross Browser</a:t>
+            </a:r>
+          </a:p>
+          <a:p>
+            <a:r>
+              <a:rPr lang="en-US" dirty="0"/>
+              <a:t>Cross Platform</a:t>
+            </a:r>
+          </a:p>
+          <a:p>
+            <a:r>
+              <a:rPr lang="en-US" dirty="0"/>
+              <a:t>Write your Tests in C# / </a:t>
+            </a:r>
+            <a:r>
+              <a:rPr lang="en-US" dirty="0" err="1"/>
+              <a:t>NUnit</a:t>
+            </a:r>
+            <a:r>
+              <a:rPr lang="en-US" dirty="0"/>
+              <a:t>!</a:t>
             </a:r>
           </a:p>
           <a:p>
             <a:pPr lvl="1"/>
             <a:r>
               <a:rPr lang="en-US" dirty="0"/>
-              <a:t>Assert </a:t>
-            </a:r>
-            <a:r>
-              <a:rPr lang="en-US" b="1" dirty="0"/>
-              <a:t>One</a:t>
-            </a:r>
+              <a:t>(or Java, Python, Typescript)</a:t>
+            </a:r>
+          </a:p>
+          <a:p>
             <a:r>
               <a:rPr lang="en-US" dirty="0"/>
-              <a:t> thing per test (makes future changes easier)</a:t>
+              <a:t>Auto-Wait</a:t>
             </a:r>
           </a:p>
           <a:p>
             <a:r>
               <a:rPr lang="en-US" dirty="0"/>
-              <a:t>Controllers </a:t>
-            </a:r>
-            <a:r>
-              <a:rPr lang="en-US" b="1" dirty="0"/>
-              <a:t>Only</a:t>
+              <a:t>Built in </a:t>
+            </a:r>
+            <a:r>
+              <a:rPr lang="en-US" dirty="0" err="1"/>
+              <a:t>TestGenerator</a:t>
             </a:r>
             <a:r>
               <a:rPr lang="en-US" dirty="0"/>
-              <a:t> Concern is Responding to Requests</a:t>
-            </a:r>
-          </a:p>
-          <a:p>
-            <a:pPr lvl="1"/>
+              <a:t> / </a:t>
+            </a:r>
+            <a:r>
+              <a:rPr lang="en-US" dirty="0" err="1"/>
+              <a:t>Codegen</a:t>
+            </a:r>
+            <a:endParaRPr lang="en-US" dirty="0"/>
+          </a:p>
+          <a:p>
             <a:r>
               <a:rPr lang="en-US" dirty="0"/>
-              <a:t>Push all business logic down a layer.</a:t>
-            </a:r>
-          </a:p>
-          <a:p>
-            <a:pPr lvl="1"/>
-            <a:r>
-              <a:rPr lang="en-US" dirty="0"/>
-              <a:t>Limit the amount of “ASP” you need to test.  </a:t>
-            </a:r>
-          </a:p>
-          <a:p>
-            <a:pPr lvl="1"/>
-            <a:r>
-              <a:rPr lang="en-US" dirty="0"/>
-              <a:t>Plain old Library testing is much simpler.</a:t>
-            </a:r>
-          </a:p>
-          <a:p>
-            <a:r>
-              <a:rPr lang="en-US" dirty="0"/>
-              <a:t>When in doubt, use </a:t>
-            </a:r>
-            <a:r>
-              <a:rPr lang="en-US" dirty="0" err="1"/>
-              <a:t>TestHost</a:t>
-            </a:r>
-            <a:r>
-              <a:rPr lang="en-US" dirty="0"/>
-              <a:t> (and/or Alba)</a:t>
-            </a:r>
-          </a:p>
-          <a:p>
-            <a:pPr lvl="1"/>
-            <a:r>
-              <a:rPr lang="en-US" dirty="0" err="1"/>
-              <a:t>TestHost</a:t>
-            </a:r>
-            <a:r>
-              <a:rPr lang="en-US" dirty="0"/>
-              <a:t> is slower, but not that slow.</a:t>
-            </a:r>
-          </a:p>
-          <a:p>
-            <a:pPr lvl="1"/>
-            <a:r>
-              <a:rPr lang="en-US" dirty="0"/>
-              <a:t>Better to test too much than not enough.</a:t>
-            </a:r>
-          </a:p>
-          <a:p>
-            <a:r>
-              <a:rPr lang="en-US" dirty="0" err="1"/>
-              <a:t>WebApplicationFactory</a:t>
-            </a:r>
-            <a:endParaRPr lang="en-US" dirty="0"/>
-          </a:p>
-          <a:p>
-            <a:pPr lvl="1"/>
-            <a:r>
-              <a:rPr lang="en-US" dirty="0"/>
-              <a:t>Intended to make </a:t>
-            </a:r>
-            <a:r>
-              <a:rPr lang="en-US" dirty="0" err="1"/>
-              <a:t>TestServer</a:t>
-            </a:r>
-            <a:r>
-              <a:rPr lang="en-US" dirty="0"/>
-              <a:t> easier to use, but hides too much</a:t>
-            </a:r>
-          </a:p>
-          <a:p>
-            <a:pPr lvl="1"/>
-            <a:endParaRPr lang="en-US" dirty="0"/>
+              <a:t>Debugging / Inspector</a:t>
+            </a:r>
           </a:p>
         </p:txBody>
       </p:sp>
@@ -8880,7 +8887,7 @@
           <p:cNvPr id="4" name="Footer Placeholder 3">
             <a:extLst>
               <a:ext uri="{FF2B5EF4-FFF2-40B4-BE49-F238E27FC236}">
-                <a16:creationId xmlns:a16="http://schemas.microsoft.com/office/drawing/2014/main" id="{9D225434-5F69-4761-AB7E-487C716E8FA7}"/>
+                <a16:creationId xmlns:a16="http://schemas.microsoft.com/office/drawing/2014/main" id="{FC6B1D6F-B91C-4822-BDFB-0465D3BE106C}"/>
               </a:ext>
             </a:extLst>
           </p:cNvPr>
@@ -8903,10 +8910,65 @@
           </a:p>
         </p:txBody>
       </p:sp>
+      <p:sp>
+        <p:nvSpPr>
+          <p:cNvPr id="6" name="Content Placeholder 5">
+            <a:extLst>
+              <a:ext uri="{FF2B5EF4-FFF2-40B4-BE49-F238E27FC236}">
+                <a16:creationId xmlns:a16="http://schemas.microsoft.com/office/drawing/2014/main" id="{EF3831CA-B054-3303-F488-B9F16B9EFD95}"/>
+              </a:ext>
+            </a:extLst>
+          </p:cNvPr>
+          <p:cNvSpPr>
+            <a:spLocks noGrp="1"/>
+          </p:cNvSpPr>
+          <p:nvPr>
+            <p:ph sz="half" idx="2"/>
+          </p:nvPr>
+        </p:nvSpPr>
+        <p:spPr/>
+        <p:txBody>
+          <a:bodyPr/>
+          <a:lstStyle/>
+          <a:p>
+            <a:endParaRPr lang="en-US"/>
+          </a:p>
+        </p:txBody>
+      </p:sp>
+      <p:pic>
+        <p:nvPicPr>
+          <p:cNvPr id="8" name="Picture 7">
+            <a:extLst>
+              <a:ext uri="{FF2B5EF4-FFF2-40B4-BE49-F238E27FC236}">
+                <a16:creationId xmlns:a16="http://schemas.microsoft.com/office/drawing/2014/main" id="{7AC061C0-6610-4DC9-23D9-1F6D1317C159}"/>
+              </a:ext>
+            </a:extLst>
+          </p:cNvPr>
+          <p:cNvPicPr>
+            <a:picLocks noChangeAspect="1"/>
+          </p:cNvPicPr>
+          <p:nvPr/>
+        </p:nvPicPr>
+        <p:blipFill>
+          <a:blip r:embed="rId2"/>
+          <a:stretch>
+            <a:fillRect/>
+          </a:stretch>
+        </p:blipFill>
+        <p:spPr>
+          <a:xfrm>
+            <a:off x="5382705" y="1754999"/>
+            <a:ext cx="6771313" cy="4553681"/>
+          </a:xfrm>
+          <a:prstGeom prst="rect">
+            <a:avLst/>
+          </a:prstGeom>
+        </p:spPr>
+      </p:pic>
     </p:spTree>
     <p:extLst>
       <p:ext uri="{BB962C8B-B14F-4D97-AF65-F5344CB8AC3E}">
-        <p14:creationId xmlns:p14="http://schemas.microsoft.com/office/powerpoint/2010/main" val="2860170561"/>
+        <p14:creationId xmlns:p14="http://schemas.microsoft.com/office/powerpoint/2010/main" val="2134038768"/>
       </p:ext>
     </p:extLst>
   </p:cSld>
@@ -8938,7 +9000,7 @@
           <p:cNvPr id="2" name="Title 1">
             <a:extLst>
               <a:ext uri="{FF2B5EF4-FFF2-40B4-BE49-F238E27FC236}">
-                <a16:creationId xmlns:a16="http://schemas.microsoft.com/office/drawing/2014/main" id="{F530A513-44AC-46C2-91B8-48831BAF7CE3}"/>
+                <a16:creationId xmlns:a16="http://schemas.microsoft.com/office/drawing/2014/main" id="{0915B5CD-5F1C-4DEE-8D85-584956D192DC}"/>
               </a:ext>
             </a:extLst>
           </p:cNvPr>
@@ -8956,17 +9018,17 @@
           <a:p>
             <a:r>
               <a:rPr lang="en-US" dirty="0"/>
-              <a:t>Questions?</a:t>
-            </a:r>
-          </a:p>
-        </p:txBody>
-      </p:sp>
-      <p:sp>
-        <p:nvSpPr>
-          <p:cNvPr id="3" name="Content Placeholder 2">
+              <a:t>DEMO</a:t>
+            </a:r>
+          </a:p>
+        </p:txBody>
+      </p:sp>
+      <p:sp>
+        <p:nvSpPr>
+          <p:cNvPr id="3" name="Text Placeholder 2">
             <a:extLst>
               <a:ext uri="{FF2B5EF4-FFF2-40B4-BE49-F238E27FC236}">
-                <a16:creationId xmlns:a16="http://schemas.microsoft.com/office/drawing/2014/main" id="{C4E5352A-63F0-44E2-88FC-C985B9B1B952}"/>
+                <a16:creationId xmlns:a16="http://schemas.microsoft.com/office/drawing/2014/main" id="{13318663-B37B-4481-9303-D7001DCE2336}"/>
               </a:ext>
             </a:extLst>
           </p:cNvPr>
@@ -8974,7 +9036,7 @@
             <a:spLocks noGrp="1"/>
           </p:cNvSpPr>
           <p:nvPr>
-            <p:ph idx="1"/>
+            <p:ph type="body" idx="1"/>
           </p:nvPr>
         </p:nvSpPr>
         <p:spPr/>
@@ -8983,120 +9045,18 @@
           <a:lstStyle/>
           <a:p>
             <a:r>
-              <a:rPr lang="en-US" dirty="0" err="1"/>
-              <a:t>xUnit</a:t>
-            </a:r>
-            <a:r>
               <a:rPr lang="en-US" dirty="0"/>
-              <a:t> - </a:t>
-            </a:r>
-            <a:r>
-              <a:rPr lang="en-US" dirty="0">
-                <a:hlinkClick r:id="rId2"/>
-              </a:rPr>
-              <a:t>https://github.com/xunit/xunit</a:t>
-            </a:r>
-            <a:endParaRPr lang="en-US" dirty="0"/>
-          </a:p>
-          <a:p>
-            <a:r>
-              <a:rPr lang="en-US" dirty="0" err="1"/>
-              <a:t>Nunit</a:t>
-            </a:r>
-            <a:r>
-              <a:rPr lang="en-US" dirty="0"/>
-              <a:t> - </a:t>
-            </a:r>
-            <a:r>
-              <a:rPr lang="en-US" dirty="0">
-                <a:hlinkClick r:id="rId3"/>
-              </a:rPr>
-              <a:t>https://github.com/nunit/nunit</a:t>
-            </a:r>
-            <a:endParaRPr lang="en-US" dirty="0"/>
-          </a:p>
-          <a:p>
-            <a:r>
-              <a:rPr lang="en-US" dirty="0" err="1"/>
-              <a:t>MSTest</a:t>
-            </a:r>
-            <a:r>
-              <a:rPr lang="en-US" dirty="0"/>
-              <a:t> - </a:t>
-            </a:r>
-            <a:r>
-              <a:rPr lang="en-US" dirty="0">
-                <a:hlinkClick r:id="rId4"/>
-              </a:rPr>
-              <a:t>https://github.com/Microsoft/testfx</a:t>
-            </a:r>
-            <a:endParaRPr lang="en-US" dirty="0"/>
-          </a:p>
-          <a:p>
-            <a:r>
-              <a:rPr lang="en-US" dirty="0"/>
-              <a:t>Alba - </a:t>
-            </a:r>
-            <a:r>
-              <a:rPr lang="en-US" dirty="0">
-                <a:hlinkClick r:id="rId5"/>
-              </a:rPr>
-              <a:t>http://jasperfx.github.io/alba/</a:t>
-            </a:r>
-            <a:endParaRPr lang="en-US" dirty="0"/>
-          </a:p>
-          <a:p>
-            <a:endParaRPr lang="en-US" dirty="0"/>
-          </a:p>
-          <a:p>
-            <a:endParaRPr lang="en-US" dirty="0"/>
-          </a:p>
-          <a:p>
-            <a:endParaRPr lang="en-US" dirty="0"/>
-          </a:p>
-          <a:p>
-            <a:pPr marL="0" indent="0">
-              <a:buNone/>
-            </a:pPr>
-            <a:endParaRPr lang="en-US" dirty="0"/>
-          </a:p>
-          <a:p>
-            <a:pPr marL="0" indent="0">
-              <a:buNone/>
-            </a:pPr>
-            <a:r>
-              <a:rPr lang="en-US" dirty="0"/>
-              <a:t>Joe Gardner | </a:t>
-            </a:r>
-            <a:r>
-              <a:rPr lang="en-US" dirty="0">
-                <a:hlinkClick r:id="rId6"/>
-              </a:rPr>
-              <a:t>joegardner@gmail.com</a:t>
-            </a:r>
-            <a:r>
-              <a:rPr lang="en-US" dirty="0"/>
-              <a:t> | </a:t>
-            </a:r>
-            <a:r>
-              <a:rPr lang="en-US" dirty="0">
-                <a:hlinkClick r:id="rId7"/>
-              </a:rPr>
-              <a:t>https://www.linkedin.com/in/joegardner</a:t>
-            </a:r>
-            <a:r>
-              <a:rPr lang="en-US" dirty="0"/>
-              <a:t> </a:t>
-            </a:r>
-          </a:p>
-        </p:txBody>
-      </p:sp>
-      <p:sp>
-        <p:nvSpPr>
-          <p:cNvPr id="5" name="Footer Placeholder 4">
+              <a:t>Browser Tests!</a:t>
+            </a:r>
+          </a:p>
+        </p:txBody>
+      </p:sp>
+      <p:sp>
+        <p:nvSpPr>
+          <p:cNvPr id="4" name="Footer Placeholder 3">
             <a:extLst>
               <a:ext uri="{FF2B5EF4-FFF2-40B4-BE49-F238E27FC236}">
-                <a16:creationId xmlns:a16="http://schemas.microsoft.com/office/drawing/2014/main" id="{FF4C231E-46E5-4C44-8A8D-F4154F14F85E}"/>
+                <a16:creationId xmlns:a16="http://schemas.microsoft.com/office/drawing/2014/main" id="{935BCD09-D093-41D0-932E-B29162412E60}"/>
               </a:ext>
             </a:extLst>
           </p:cNvPr>
@@ -9122,7 +9082,7 @@
     </p:spTree>
     <p:extLst>
       <p:ext uri="{BB962C8B-B14F-4D97-AF65-F5344CB8AC3E}">
-        <p14:creationId xmlns:p14="http://schemas.microsoft.com/office/powerpoint/2010/main" val="1841119610"/>
+        <p14:creationId xmlns:p14="http://schemas.microsoft.com/office/powerpoint/2010/main" val="799382902"/>
       </p:ext>
     </p:extLst>
   </p:cSld>
@@ -9154,7 +9114,7 @@
           <p:cNvPr id="2" name="Title 1">
             <a:extLst>
               <a:ext uri="{FF2B5EF4-FFF2-40B4-BE49-F238E27FC236}">
-                <a16:creationId xmlns:a16="http://schemas.microsoft.com/office/drawing/2014/main" id="{1FDBC2BD-4C00-4249-A39C-32B3B0AE66F6}"/>
+                <a16:creationId xmlns:a16="http://schemas.microsoft.com/office/drawing/2014/main" id="{F530A513-44AC-46C2-91B8-48831BAF7CE3}"/>
               </a:ext>
             </a:extLst>
           </p:cNvPr>
@@ -9172,7 +9132,7 @@
           <a:p>
             <a:r>
               <a:rPr lang="en-US" dirty="0"/>
-              <a:t>Alba Makes it Easier?</a:t>
+              <a:t>Questions?</a:t>
             </a:r>
           </a:p>
         </p:txBody>
@@ -9182,7 +9142,7 @@
           <p:cNvPr id="3" name="Content Placeholder 2">
             <a:extLst>
               <a:ext uri="{FF2B5EF4-FFF2-40B4-BE49-F238E27FC236}">
-                <a16:creationId xmlns:a16="http://schemas.microsoft.com/office/drawing/2014/main" id="{E76DF5A2-93C5-4780-9EB9-EAE2FD60460D}"/>
+                <a16:creationId xmlns:a16="http://schemas.microsoft.com/office/drawing/2014/main" id="{C4E5352A-63F0-44E2-88FC-C985B9B1B952}"/>
               </a:ext>
             </a:extLst>
           </p:cNvPr>
@@ -9193,66 +9153,157 @@
             <p:ph sz="half" idx="1"/>
           </p:nvPr>
         </p:nvSpPr>
-        <p:spPr/>
+        <p:spPr>
+          <a:xfrm>
+            <a:off x="1097279" y="1845734"/>
+            <a:ext cx="6507169" cy="4023359"/>
+          </a:xfrm>
+        </p:spPr>
         <p:txBody>
           <a:bodyPr>
-            <a:normAutofit/>
+            <a:normAutofit fontScale="92500" lnSpcReduction="10000"/>
           </a:bodyPr>
           <a:lstStyle/>
           <a:p>
             <a:r>
               <a:rPr lang="en-US" dirty="0"/>
-              <a:t>Based on/extends </a:t>
-            </a:r>
+              <a:t>MS Docs - </a:t>
+            </a:r>
+            <a:r>
+              <a:rPr lang="en-US" dirty="0">
+                <a:hlinkClick r:id="rId2"/>
+              </a:rPr>
+              <a:t>Integration Testing </a:t>
+            </a:r>
+            <a:r>
+              <a:rPr lang="en-US" dirty="0" err="1">
+                <a:hlinkClick r:id="rId2"/>
+              </a:rPr>
+              <a:t>ASP.Net</a:t>
+            </a:r>
+            <a:r>
+              <a:rPr lang="en-US" dirty="0">
+                <a:hlinkClick r:id="rId2"/>
+              </a:rPr>
+              <a:t> Core</a:t>
+            </a:r>
+            <a:endParaRPr lang="en-US" dirty="0"/>
+          </a:p>
+          <a:p>
             <a:r>
               <a:rPr lang="en-US" dirty="0" err="1"/>
-              <a:t>TestHost</a:t>
+              <a:t>xUnit</a:t>
             </a:r>
             <a:r>
               <a:rPr lang="en-US" dirty="0"/>
-              <a:t>.</a:t>
-            </a:r>
-          </a:p>
-          <a:p>
+              <a:t> - </a:t>
+            </a:r>
+            <a:r>
+              <a:rPr lang="en-US" dirty="0">
+                <a:hlinkClick r:id="rId3"/>
+              </a:rPr>
+              <a:t>https://github.com/xunit/xunit</a:t>
+            </a:r>
+            <a:endParaRPr lang="en-US" dirty="0"/>
+          </a:p>
+          <a:p>
+            <a:r>
+              <a:rPr lang="en-US" dirty="0" err="1"/>
+              <a:t>Nunit</a:t>
+            </a:r>
             <a:r>
               <a:rPr lang="en-US" dirty="0"/>
-              <a:t>Declarative “Scenario” style tests and assertions</a:t>
-            </a:r>
-          </a:p>
-          <a:p>
+              <a:t> - </a:t>
+            </a:r>
+            <a:r>
+              <a:rPr lang="en-US" dirty="0">
+                <a:hlinkClick r:id="rId4"/>
+              </a:rPr>
+              <a:t>https://github.com/nunit/nunit</a:t>
+            </a:r>
             <a:endParaRPr lang="en-US" dirty="0"/>
           </a:p>
           <a:p>
+            <a:r>
+              <a:rPr lang="en-US" dirty="0"/>
+              <a:t>Playwright - </a:t>
+            </a:r>
+            <a:r>
+              <a:rPr lang="en-US" dirty="0">
+                <a:hlinkClick r:id="rId5"/>
+              </a:rPr>
+              <a:t>https://playwright.dev/</a:t>
+            </a:r>
             <a:endParaRPr lang="en-US" dirty="0"/>
           </a:p>
           <a:p>
+            <a:r>
+              <a:rPr lang="en-US" dirty="0"/>
+              <a:t>Kent Beck - </a:t>
+            </a:r>
+            <a:r>
+              <a:rPr lang="en-US" dirty="0">
+                <a:hlinkClick r:id="rId6"/>
+              </a:rPr>
+              <a:t>Test Driven Development: By Example</a:t>
+            </a:r>
             <a:endParaRPr lang="en-US" dirty="0"/>
           </a:p>
           <a:p>
             <a:endParaRPr lang="en-US" dirty="0"/>
           </a:p>
           <a:p>
+            <a:endParaRPr lang="en-US" dirty="0"/>
+          </a:p>
+          <a:p>
+            <a:pPr marL="0" indent="0">
+              <a:buNone/>
+            </a:pPr>
+            <a:endParaRPr lang="en-US" dirty="0"/>
+          </a:p>
+          <a:p>
+            <a:pPr marL="0" indent="0">
+              <a:buNone/>
+            </a:pPr>
             <a:r>
               <a:rPr lang="en-US" dirty="0"/>
-              <a:t>Open Source Project by Jeremy Miller (of </a:t>
-            </a:r>
-            <a:r>
-              <a:rPr lang="en-US" dirty="0" err="1"/>
-              <a:t>StructureMap</a:t>
-            </a:r>
+              <a:t>Joe Gardner | </a:t>
+            </a:r>
+            <a:r>
+              <a:rPr lang="en-US" dirty="0">
+                <a:hlinkClick r:id="rId7"/>
+              </a:rPr>
+              <a:t>joe.gardner@carvana.com</a:t>
+            </a:r>
+            <a:endParaRPr lang="en-US" dirty="0"/>
+          </a:p>
+          <a:p>
+            <a:pPr marL="0" indent="0">
+              <a:buNone/>
+            </a:pPr>
             <a:r>
               <a:rPr lang="en-US" dirty="0"/>
-              <a:t> fame)</a:t>
-            </a:r>
-          </a:p>
-        </p:txBody>
-      </p:sp>
-      <p:sp>
-        <p:nvSpPr>
-          <p:cNvPr id="4" name="Content Placeholder 3">
+              <a:t> </a:t>
+            </a:r>
+            <a:r>
+              <a:rPr lang="en-US" dirty="0">
+                <a:hlinkClick r:id="rId8"/>
+              </a:rPr>
+              <a:t>https://www.linkedin.com/in/joegardner</a:t>
+            </a:r>
+            <a:r>
+              <a:rPr lang="en-US" dirty="0"/>
+              <a:t> </a:t>
+            </a:r>
+          </a:p>
+        </p:txBody>
+      </p:sp>
+      <p:sp>
+        <p:nvSpPr>
+          <p:cNvPr id="5" name="Footer Placeholder 4">
             <a:extLst>
               <a:ext uri="{FF2B5EF4-FFF2-40B4-BE49-F238E27FC236}">
-                <a16:creationId xmlns:a16="http://schemas.microsoft.com/office/drawing/2014/main" id="{02701603-CEF3-49CC-A363-395611782BC3}"/>
+                <a16:creationId xmlns:a16="http://schemas.microsoft.com/office/drawing/2014/main" id="{FF4C231E-46E5-4C44-8A8D-F4154F14F85E}"/>
               </a:ext>
             </a:extLst>
           </p:cNvPr>
@@ -9260,91 +9311,60 @@
             <a:spLocks noGrp="1"/>
           </p:cNvSpPr>
           <p:nvPr>
-            <p:ph sz="half" idx="2"/>
+            <p:ph type="ftr" sz="quarter" idx="11"/>
           </p:nvPr>
         </p:nvSpPr>
         <p:spPr/>
         <p:txBody>
-          <a:bodyPr>
-            <a:normAutofit/>
-          </a:bodyPr>
+          <a:bodyPr/>
           <a:lstStyle/>
           <a:p>
             <a:r>
-              <a:rPr lang="en-US" dirty="0">
-                <a:hlinkClick r:id="rId2"/>
-              </a:rPr>
-              <a:t>http://jasperfx.github.io/alba/</a:t>
-            </a:r>
-            <a:endParaRPr lang="en-US" dirty="0"/>
-          </a:p>
-          <a:p>
-            <a:endParaRPr lang="en-US" dirty="0"/>
-          </a:p>
-        </p:txBody>
-      </p:sp>
-      <p:sp>
-        <p:nvSpPr>
-          <p:cNvPr id="6" name="Footer Placeholder 5">
+              <a:rPr lang="en-US"/>
+              <a:t>https://github.com/joegardnr/TestingAspNetCore</a:t>
+            </a:r>
+          </a:p>
+        </p:txBody>
+      </p:sp>
+      <p:pic>
+        <p:nvPicPr>
+          <p:cNvPr id="9" name="Content Placeholder 8" descr="Qr code&#10;&#10;Description automatically generated">
             <a:extLst>
               <a:ext uri="{FF2B5EF4-FFF2-40B4-BE49-F238E27FC236}">
-                <a16:creationId xmlns:a16="http://schemas.microsoft.com/office/drawing/2014/main" id="{4AB76E81-4120-4DED-9EE2-AC3A97E1D302}"/>
-              </a:ext>
-            </a:extLst>
-          </p:cNvPr>
-          <p:cNvSpPr>
-            <a:spLocks noGrp="1"/>
-          </p:cNvSpPr>
-          <p:nvPr>
-            <p:ph type="ftr" sz="quarter" idx="11"/>
-          </p:nvPr>
-        </p:nvSpPr>
-        <p:spPr/>
-        <p:txBody>
-          <a:bodyPr/>
-          <a:lstStyle/>
-          <a:p>
-            <a:r>
-              <a:rPr lang="en-US"/>
-              <a:t>https://github.com/joegardnr/TestingAspNetCore</a:t>
-            </a:r>
-          </a:p>
-        </p:txBody>
-      </p:sp>
-      <p:pic>
-        <p:nvPicPr>
-          <p:cNvPr id="5" name="Picture 4">
-            <a:extLst>
-              <a:ext uri="{FF2B5EF4-FFF2-40B4-BE49-F238E27FC236}">
-                <a16:creationId xmlns:a16="http://schemas.microsoft.com/office/drawing/2014/main" id="{703A68D0-8F17-4D85-ABA1-10A23F3E6EDE}"/>
+                <a16:creationId xmlns:a16="http://schemas.microsoft.com/office/drawing/2014/main" id="{FA6FC241-3920-954A-52D3-72A03DECA2B2}"/>
               </a:ext>
             </a:extLst>
           </p:cNvPr>
           <p:cNvPicPr>
-            <a:picLocks noChangeAspect="1"/>
+            <a:picLocks noGrp="1" noChangeAspect="1"/>
           </p:cNvPicPr>
-          <p:nvPr/>
+          <p:nvPr>
+            <p:ph sz="half" idx="2"/>
+          </p:nvPr>
         </p:nvPicPr>
         <p:blipFill>
-          <a:blip r:embed="rId3"/>
+          <a:blip r:embed="rId9">
+            <a:extLst>
+              <a:ext uri="{28A0092B-C50C-407E-A947-70E740481C1C}">
+                <a14:useLocalDpi xmlns:a14="http://schemas.microsoft.com/office/drawing/2010/main" val="0"/>
+              </a:ext>
+            </a:extLst>
+          </a:blip>
           <a:stretch>
             <a:fillRect/>
           </a:stretch>
         </p:blipFill>
         <p:spPr>
           <a:xfrm>
-            <a:off x="6156964" y="2243768"/>
-            <a:ext cx="5859674" cy="3733702"/>
+            <a:off x="7132955" y="1845734"/>
+            <a:ext cx="4022725" cy="4022725"/>
           </a:xfrm>
-          <a:prstGeom prst="rect">
-            <a:avLst/>
-          </a:prstGeom>
         </p:spPr>
       </p:pic>
     </p:spTree>
     <p:extLst>
       <p:ext uri="{BB962C8B-B14F-4D97-AF65-F5344CB8AC3E}">
-        <p14:creationId xmlns:p14="http://schemas.microsoft.com/office/powerpoint/2010/main" val="3043276679"/>
+        <p14:creationId xmlns:p14="http://schemas.microsoft.com/office/powerpoint/2010/main" val="1841119610"/>
       </p:ext>
     </p:extLst>
   </p:cSld>
@@ -9444,7 +9464,7 @@
             </a:r>
             <a:r>
               <a:rPr lang="en-US" sz="2400" dirty="0"/>
-              <a:t> Core Runtime (Windows, Linux, and macOS)</a:t>
+              <a:t> 6 Runtime (Windows, Linux, and macOS)</a:t>
             </a:r>
           </a:p>
           <a:p>
@@ -9472,6 +9492,17 @@
               <a:rPr lang="en-US" sz="2400" dirty="0"/>
               <a:t>Built In Dependency Injection</a:t>
             </a:r>
+          </a:p>
+          <a:p>
+            <a:r>
+              <a:rPr lang="en-US" sz="2400" dirty="0"/>
+              <a:t>Build Single Page Applications with </a:t>
+            </a:r>
+            <a:r>
+              <a:rPr lang="en-US" sz="2400" dirty="0" err="1"/>
+              <a:t>Blazor</a:t>
+            </a:r>
+            <a:endParaRPr lang="en-US" sz="2400" dirty="0"/>
           </a:p>
           <a:p>
             <a:endParaRPr lang="en-US" dirty="0"/>
@@ -9613,7 +9644,7 @@
                   </a:schemeClr>
                 </a:solidFill>
               </a:rPr>
-              <a:t>Executions of your code that verify results without human user intervention.</a:t>
+              <a:t>Executions of your code that verify results without human intervention.</a:t>
             </a:r>
           </a:p>
         </p:txBody>
@@ -9722,7 +9753,9 @@
         </p:nvSpPr>
         <p:spPr/>
         <p:txBody>
-          <a:bodyPr/>
+          <a:bodyPr>
+            <a:normAutofit fontScale="92500" lnSpcReduction="10000"/>
+          </a:bodyPr>
           <a:lstStyle/>
           <a:p>
             <a:r>
@@ -9757,7 +9790,7 @@
                   </a:schemeClr>
                 </a:solidFill>
               </a:rPr>
-              <a:t>Repeatable / Reusable</a:t>
+              <a:t>Future changes are safer</a:t>
             </a:r>
           </a:p>
           <a:p>
@@ -9769,7 +9802,7 @@
                   </a:schemeClr>
                 </a:solidFill>
               </a:rPr>
-              <a:t>Future changes are safer</a:t>
+              <a:t>Shortens the Feedback Cycle</a:t>
             </a:r>
           </a:p>
           <a:p>
@@ -9781,7 +9814,19 @@
                   </a:schemeClr>
                 </a:solidFill>
               </a:rPr>
-              <a:t>Shortens the Feedback Cycle</a:t>
+              <a:t>Tests are a form of (Developer) Documentation</a:t>
+            </a:r>
+          </a:p>
+          <a:p>
+            <a:r>
+              <a:rPr lang="en-US" sz="4400" i="1" dirty="0">
+                <a:solidFill>
+                  <a:schemeClr val="bg1">
+                    <a:lumMod val="50000"/>
+                  </a:schemeClr>
+                </a:solidFill>
+              </a:rPr>
+              <a:t>Helps you Design your Application</a:t>
             </a:r>
           </a:p>
           <a:p>
@@ -9957,7 +10002,7 @@
                   </a:schemeClr>
                 </a:solidFill>
               </a:rPr>
-              <a:t>10x Engineers Don’t Write Tests!</a:t>
+              <a:t>I don’t write Bugs!</a:t>
             </a:r>
           </a:p>
           <a:p>
@@ -10951,7 +10996,7 @@
           <a:p>
             <a:r>
               <a:rPr lang="en-US" dirty="0"/>
-              <a:t>Acceptance Tests</a:t>
+              <a:t>User Acceptance Tests (aka End to End Tests)</a:t>
             </a:r>
           </a:p>
           <a:p>
@@ -11142,10 +11187,17 @@
           <a:lstStyle/>
           <a:p>
             <a:r>
-              <a:rPr lang="en-US"/>
-              <a:t>Unit Tests for ASP.Net Core</a:t>
-            </a:r>
-            <a:endParaRPr lang="en-US" dirty="0"/>
+              <a:rPr lang="en-US" dirty="0"/>
+              <a:t>Unit Tests for </a:t>
+            </a:r>
+            <a:r>
+              <a:rPr lang="en-US" dirty="0" err="1"/>
+              <a:t>ASP.Net</a:t>
+            </a:r>
+            <a:r>
+              <a:rPr lang="en-US" dirty="0"/>
+              <a:t> Core</a:t>
+            </a:r>
           </a:p>
         </p:txBody>
       </p:sp>
@@ -11273,14 +11325,7 @@
           <a:p>
             <a:r>
               <a:rPr lang="en-US" dirty="0"/>
-              <a:t>Mocking</a:t>
-            </a:r>
-          </a:p>
-          <a:p>
-            <a:pPr lvl="1"/>
-            <a:r>
-              <a:rPr lang="en-US" dirty="0"/>
-              <a:t>Code Mocks (hand coded)</a:t>
+              <a:t>Utility Libraries</a:t>
             </a:r>
           </a:p>
           <a:p>
@@ -11291,31 +11336,34 @@
             </a:r>
             <a:r>
               <a:rPr lang="en-US" dirty="0"/>
-              <a:t> - </a:t>
-            </a:r>
-            <a:r>
-              <a:rPr lang="en-US" dirty="0">
-                <a:hlinkClick r:id="rId6"/>
-              </a:rPr>
-              <a:t>https://github.com/Moq/moq4/</a:t>
-            </a:r>
-            <a:endParaRPr lang="en-US" dirty="0"/>
-          </a:p>
-          <a:p>
-            <a:pPr lvl="1"/>
+              <a:t>, </a:t>
+            </a:r>
             <a:r>
               <a:rPr lang="en-US" dirty="0" err="1"/>
               <a:t>Nsubstitute</a:t>
             </a:r>
             <a:r>
               <a:rPr lang="en-US" dirty="0"/>
-              <a:t> - </a:t>
-            </a:r>
-            <a:r>
-              <a:rPr lang="en-US" dirty="0">
-                <a:hlinkClick r:id="rId7"/>
-              </a:rPr>
-              <a:t>https://nsubstitute.github.io/</a:t>
+              <a:t>, </a:t>
+            </a:r>
+            <a:r>
+              <a:rPr lang="en-US" dirty="0" err="1"/>
+              <a:t>FakeItEasy</a:t>
+            </a:r>
+            <a:endParaRPr lang="en-US" dirty="0"/>
+          </a:p>
+          <a:p>
+            <a:pPr lvl="1"/>
+            <a:r>
+              <a:rPr lang="en-US" dirty="0"/>
+              <a:t>Fluent Assertion</a:t>
+            </a:r>
+          </a:p>
+          <a:p>
+            <a:pPr lvl="1"/>
+            <a:r>
+              <a:rPr lang="en-US" dirty="0" err="1"/>
+              <a:t>AutoFixture</a:t>
             </a:r>
             <a:endParaRPr lang="en-US" dirty="0"/>
           </a:p>
@@ -11364,7 +11412,7 @@
           <p:nvPr/>
         </p:nvPicPr>
         <p:blipFill>
-          <a:blip r:embed="rId8"/>
+          <a:blip r:embed="rId6"/>
           <a:stretch>
             <a:fillRect/>
           </a:stretch>

</xml_diff>